<commit_message>
Update to file structure
</commit_message>
<xml_diff>
--- a/Presentation/PHS Rshiny Team Klas.pptx
+++ b/Presentation/PHS Rshiny Team Klas.pptx
@@ -13278,77 +13278,6 @@
       </p:sp>
       <p:sp>
         <p:nvSpPr>
-          <p:cNvPr id="5" name="Title 1">
-            <a:extLst>
-              <a:ext uri="{FF2B5EF4-FFF2-40B4-BE49-F238E27FC236}">
-                <a16:creationId xmlns:a16="http://schemas.microsoft.com/office/drawing/2014/main" id="{31C314B7-ECBF-CC46-A7D3-F5EE0B66B0FC}"/>
-              </a:ext>
-            </a:extLst>
-          </p:cNvPr>
-          <p:cNvSpPr txBox="1">
-            <a:spLocks/>
-          </p:cNvSpPr>
-          <p:nvPr/>
-        </p:nvSpPr>
-        <p:spPr>
-          <a:xfrm>
-            <a:off x="7639854" y="265385"/>
-            <a:ext cx="3031524" cy="1752461"/>
-          </a:xfrm>
-          <a:prstGeom prst="rect">
-            <a:avLst/>
-          </a:prstGeom>
-          <a:noFill/>
-          <a:ln w="19050">
-            <a:noFill/>
-            <a:prstDash val="dash"/>
-          </a:ln>
-        </p:spPr>
-        <p:txBody>
-          <a:bodyPr vert="horz" lIns="91440" tIns="45720" rIns="91440" bIns="45720" rtlCol="0" anchor="b">
-            <a:normAutofit/>
-          </a:bodyPr>
-          <a:lstStyle>
-            <a:lvl1pPr algn="r" defTabSz="914400" rtl="0" eaLnBrk="1" latinLnBrk="0" hangingPunct="1">
-              <a:lnSpc>
-                <a:spcPct val="90000"/>
-              </a:lnSpc>
-              <a:spcBef>
-                <a:spcPct val="0"/>
-              </a:spcBef>
-              <a:buNone/>
-              <a:defRPr sz="4000" kern="1200" cap="all" baseline="0">
-                <a:solidFill>
-                  <a:schemeClr val="tx1"/>
-                </a:solidFill>
-                <a:latin typeface="+mj-lt"/>
-                <a:ea typeface="+mj-ea"/>
-                <a:cs typeface="+mj-cs"/>
-              </a:defRPr>
-            </a:lvl1pPr>
-          </a:lstStyle>
-          <a:p>
-            <a:pPr algn="l">
-              <a:spcAft>
-                <a:spcPts val="600"/>
-              </a:spcAft>
-            </a:pPr>
-            <a:r>
-              <a:rPr lang="en-US" sz="4800" b="1" kern="1200" cap="all" baseline="0" dirty="0">
-                <a:solidFill>
-                  <a:schemeClr val="tx1"/>
-                </a:solidFill>
-                <a:latin typeface="+mj-lt"/>
-                <a:ea typeface="+mj-ea"/>
-                <a:cs typeface="+mj-cs"/>
-              </a:rPr>
-              <a:t>SHINY APP</a:t>
-            </a:r>
-          </a:p>
-        </p:txBody>
-      </p:sp>
-      <p:sp>
-        <p:nvSpPr>
           <p:cNvPr id="6" name="Content Placeholder 12">
             <a:extLst>
               <a:ext uri="{FF2B5EF4-FFF2-40B4-BE49-F238E27FC236}">
@@ -13363,7 +13292,7 @@
         </p:nvSpPr>
         <p:spPr>
           <a:xfrm>
-            <a:off x="7969503" y="2032380"/>
+            <a:off x="8102025" y="2853642"/>
             <a:ext cx="3787650" cy="2058765"/>
           </a:xfrm>
           <a:prstGeom prst="rect">
@@ -13896,6 +13825,217 @@
           </a:prstGeom>
         </p:spPr>
       </p:pic>
+      <p:sp>
+        <p:nvSpPr>
+          <p:cNvPr id="14" name="Content Placeholder 12">
+            <a:extLst>
+              <a:ext uri="{FF2B5EF4-FFF2-40B4-BE49-F238E27FC236}">
+                <a16:creationId xmlns:a16="http://schemas.microsoft.com/office/drawing/2014/main" id="{3C1E4713-81CD-6F48-BDC6-48AC37D06B70}"/>
+              </a:ext>
+            </a:extLst>
+          </p:cNvPr>
+          <p:cNvSpPr txBox="1">
+            <a:spLocks/>
+          </p:cNvSpPr>
+          <p:nvPr/>
+        </p:nvSpPr>
+        <p:spPr>
+          <a:xfrm>
+            <a:off x="7534656" y="589183"/>
+            <a:ext cx="3787650" cy="2058765"/>
+          </a:xfrm>
+          <a:prstGeom prst="rect">
+            <a:avLst/>
+          </a:prstGeom>
+          <a:noFill/>
+          <a:ln w="19050">
+            <a:noFill/>
+            <a:prstDash val="dash"/>
+          </a:ln>
+        </p:spPr>
+        <p:txBody>
+          <a:bodyPr vert="horz" lIns="91440" tIns="45720" rIns="91440" bIns="45720" rtlCol="0">
+            <a:normAutofit/>
+          </a:bodyPr>
+          <a:lstStyle>
+            <a:lvl1pPr marL="228600" indent="-228600" algn="l" defTabSz="914400" rtl="0" eaLnBrk="1" latinLnBrk="0" hangingPunct="1">
+              <a:lnSpc>
+                <a:spcPct val="90000"/>
+              </a:lnSpc>
+              <a:spcBef>
+                <a:spcPts val="1000"/>
+              </a:spcBef>
+              <a:buFont typeface="Arial" panose="020B0604020202020204" pitchFamily="34" charset="0"/>
+              <a:buChar char="•"/>
+              <a:defRPr sz="2200" kern="1200">
+                <a:solidFill>
+                  <a:schemeClr val="tx1"/>
+                </a:solidFill>
+                <a:latin typeface="+mn-lt"/>
+                <a:ea typeface="+mn-ea"/>
+                <a:cs typeface="+mn-cs"/>
+              </a:defRPr>
+            </a:lvl1pPr>
+            <a:lvl2pPr marL="685800" indent="-228600" algn="l" defTabSz="914400" rtl="0" eaLnBrk="1" latinLnBrk="0" hangingPunct="1">
+              <a:lnSpc>
+                <a:spcPct val="90000"/>
+              </a:lnSpc>
+              <a:spcBef>
+                <a:spcPts val="500"/>
+              </a:spcBef>
+              <a:buFont typeface="Arial" panose="020B0604020202020204" pitchFamily="34" charset="0"/>
+              <a:buChar char="•"/>
+              <a:defRPr sz="2000" kern="1200">
+                <a:solidFill>
+                  <a:schemeClr val="tx1"/>
+                </a:solidFill>
+                <a:latin typeface="+mn-lt"/>
+                <a:ea typeface="+mn-ea"/>
+                <a:cs typeface="+mn-cs"/>
+              </a:defRPr>
+            </a:lvl2pPr>
+            <a:lvl3pPr marL="1143000" indent="-228600" algn="l" defTabSz="914400" rtl="0" eaLnBrk="1" latinLnBrk="0" hangingPunct="1">
+              <a:lnSpc>
+                <a:spcPct val="90000"/>
+              </a:lnSpc>
+              <a:spcBef>
+                <a:spcPts val="500"/>
+              </a:spcBef>
+              <a:buFont typeface="Arial" panose="020B0604020202020204" pitchFamily="34" charset="0"/>
+              <a:buChar char="•"/>
+              <a:defRPr sz="1800" kern="1200">
+                <a:solidFill>
+                  <a:schemeClr val="tx1"/>
+                </a:solidFill>
+                <a:latin typeface="+mn-lt"/>
+                <a:ea typeface="+mn-ea"/>
+                <a:cs typeface="+mn-cs"/>
+              </a:defRPr>
+            </a:lvl3pPr>
+            <a:lvl4pPr marL="1600200" indent="-228600" algn="l" defTabSz="914400" rtl="0" eaLnBrk="1" latinLnBrk="0" hangingPunct="1">
+              <a:lnSpc>
+                <a:spcPct val="90000"/>
+              </a:lnSpc>
+              <a:spcBef>
+                <a:spcPts val="500"/>
+              </a:spcBef>
+              <a:buFont typeface="Arial" panose="020B0604020202020204" pitchFamily="34" charset="0"/>
+              <a:buChar char="•"/>
+              <a:defRPr sz="1600" kern="1200">
+                <a:solidFill>
+                  <a:schemeClr val="tx1"/>
+                </a:solidFill>
+                <a:latin typeface="+mn-lt"/>
+                <a:ea typeface="+mn-ea"/>
+                <a:cs typeface="+mn-cs"/>
+              </a:defRPr>
+            </a:lvl4pPr>
+            <a:lvl5pPr marL="2057400" indent="-228600" algn="l" defTabSz="914400" rtl="0" eaLnBrk="1" latinLnBrk="0" hangingPunct="1">
+              <a:lnSpc>
+                <a:spcPct val="90000"/>
+              </a:lnSpc>
+              <a:spcBef>
+                <a:spcPts val="500"/>
+              </a:spcBef>
+              <a:buFont typeface="Arial" panose="020B0604020202020204" pitchFamily="34" charset="0"/>
+              <a:buChar char="•"/>
+              <a:defRPr sz="1600" kern="1200">
+                <a:solidFill>
+                  <a:schemeClr val="tx1"/>
+                </a:solidFill>
+                <a:latin typeface="+mn-lt"/>
+                <a:ea typeface="+mn-ea"/>
+                <a:cs typeface="+mn-cs"/>
+              </a:defRPr>
+            </a:lvl5pPr>
+            <a:lvl6pPr marL="2514600" indent="-228600" algn="l" defTabSz="914400" rtl="0" eaLnBrk="1" latinLnBrk="0" hangingPunct="1">
+              <a:lnSpc>
+                <a:spcPct val="90000"/>
+              </a:lnSpc>
+              <a:spcBef>
+                <a:spcPts val="500"/>
+              </a:spcBef>
+              <a:buFont typeface="Arial" panose="020B0604020202020204" pitchFamily="34" charset="0"/>
+              <a:buChar char="•"/>
+              <a:defRPr sz="1600" kern="1200">
+                <a:solidFill>
+                  <a:schemeClr val="tx1"/>
+                </a:solidFill>
+                <a:latin typeface="+mn-lt"/>
+                <a:ea typeface="+mn-ea"/>
+                <a:cs typeface="+mn-cs"/>
+              </a:defRPr>
+            </a:lvl6pPr>
+            <a:lvl7pPr marL="2971800" indent="-228600" algn="l" defTabSz="914400" rtl="0" eaLnBrk="1" latinLnBrk="0" hangingPunct="1">
+              <a:lnSpc>
+                <a:spcPct val="90000"/>
+              </a:lnSpc>
+              <a:spcBef>
+                <a:spcPts val="500"/>
+              </a:spcBef>
+              <a:buFont typeface="Arial" panose="020B0604020202020204" pitchFamily="34" charset="0"/>
+              <a:buChar char="•"/>
+              <a:defRPr sz="1600" kern="1200">
+                <a:solidFill>
+                  <a:schemeClr val="tx1"/>
+                </a:solidFill>
+                <a:latin typeface="+mn-lt"/>
+                <a:ea typeface="+mn-ea"/>
+                <a:cs typeface="+mn-cs"/>
+              </a:defRPr>
+            </a:lvl7pPr>
+            <a:lvl8pPr marL="3429000" indent="-228600" algn="l" defTabSz="914400" rtl="0" eaLnBrk="1" latinLnBrk="0" hangingPunct="1">
+              <a:lnSpc>
+                <a:spcPct val="90000"/>
+              </a:lnSpc>
+              <a:spcBef>
+                <a:spcPts val="500"/>
+              </a:spcBef>
+              <a:buFont typeface="Arial" panose="020B0604020202020204" pitchFamily="34" charset="0"/>
+              <a:buChar char="•"/>
+              <a:defRPr sz="1600" kern="1200">
+                <a:solidFill>
+                  <a:schemeClr val="tx1"/>
+                </a:solidFill>
+                <a:latin typeface="+mn-lt"/>
+                <a:ea typeface="+mn-ea"/>
+                <a:cs typeface="+mn-cs"/>
+              </a:defRPr>
+            </a:lvl8pPr>
+            <a:lvl9pPr marL="3886200" indent="-228600" algn="l" defTabSz="914400" rtl="0" eaLnBrk="1" latinLnBrk="0" hangingPunct="1">
+              <a:lnSpc>
+                <a:spcPct val="90000"/>
+              </a:lnSpc>
+              <a:spcBef>
+                <a:spcPts val="500"/>
+              </a:spcBef>
+              <a:buFont typeface="Arial" panose="020B0604020202020204" pitchFamily="34" charset="0"/>
+              <a:buChar char="•"/>
+              <a:defRPr sz="1600" kern="1200">
+                <a:solidFill>
+                  <a:schemeClr val="tx1"/>
+                </a:solidFill>
+                <a:latin typeface="+mn-lt"/>
+                <a:ea typeface="+mn-ea"/>
+                <a:cs typeface="+mn-cs"/>
+              </a:defRPr>
+            </a:lvl9pPr>
+          </a:lstStyle>
+          <a:p>
+            <a:pPr marL="0" indent="0">
+              <a:spcAft>
+                <a:spcPts val="600"/>
+              </a:spcAft>
+              <a:buNone/>
+            </a:pPr>
+            <a:r>
+              <a:rPr lang="en-US" sz="2800" b="1" dirty="0"/>
+              <a:t>Winter Affectations Post-2020 on Scottish Health Service Application</a:t>
+            </a:r>
+            <a:endParaRPr lang="en-US" sz="2800" b="1" cap="all" dirty="0"/>
+          </a:p>
+        </p:txBody>
+      </p:sp>
     </p:spTree>
     <p:extLst>
       <p:ext uri="{BB962C8B-B14F-4D97-AF65-F5344CB8AC3E}">
@@ -13974,6 +14114,208 @@
                 <a:schemeClr val="bg2"/>
               </a:solidFill>
             </a:endParaRPr>
+          </a:p>
+        </p:txBody>
+      </p:sp>
+      <p:sp>
+        <p:nvSpPr>
+          <p:cNvPr id="3" name="Text Placeholder 2">
+            <a:extLst>
+              <a:ext uri="{FF2B5EF4-FFF2-40B4-BE49-F238E27FC236}">
+                <a16:creationId xmlns:a16="http://schemas.microsoft.com/office/drawing/2014/main" id="{4DBBC3C5-EEA4-AF4F-AC77-C7F9E47789F5}"/>
+              </a:ext>
+            </a:extLst>
+          </p:cNvPr>
+          <p:cNvSpPr txBox="1">
+            <a:spLocks/>
+          </p:cNvSpPr>
+          <p:nvPr/>
+        </p:nvSpPr>
+        <p:spPr>
+          <a:xfrm>
+            <a:off x="3566440" y="3158956"/>
+            <a:ext cx="5059120" cy="1863618"/>
+          </a:xfrm>
+          <a:prstGeom prst="rect">
+            <a:avLst/>
+          </a:prstGeom>
+        </p:spPr>
+        <p:txBody>
+          <a:bodyPr>
+            <a:noAutofit/>
+          </a:bodyPr>
+          <a:lstStyle>
+            <a:lvl1pPr marL="228600" indent="-228600" algn="l" defTabSz="914400" rtl="0" eaLnBrk="1" latinLnBrk="0" hangingPunct="1">
+              <a:lnSpc>
+                <a:spcPct val="90000"/>
+              </a:lnSpc>
+              <a:spcBef>
+                <a:spcPts val="1000"/>
+              </a:spcBef>
+              <a:buFont typeface="Arial" panose="020B0604020202020204" pitchFamily="34" charset="0"/>
+              <a:buChar char="•"/>
+              <a:defRPr sz="2200" kern="1200">
+                <a:solidFill>
+                  <a:schemeClr val="tx1"/>
+                </a:solidFill>
+                <a:latin typeface="+mn-lt"/>
+                <a:ea typeface="+mn-ea"/>
+                <a:cs typeface="+mn-cs"/>
+              </a:defRPr>
+            </a:lvl1pPr>
+            <a:lvl2pPr marL="685800" indent="-228600" algn="l" defTabSz="914400" rtl="0" eaLnBrk="1" latinLnBrk="0" hangingPunct="1">
+              <a:lnSpc>
+                <a:spcPct val="90000"/>
+              </a:lnSpc>
+              <a:spcBef>
+                <a:spcPts val="500"/>
+              </a:spcBef>
+              <a:buFont typeface="Arial" panose="020B0604020202020204" pitchFamily="34" charset="0"/>
+              <a:buChar char="•"/>
+              <a:defRPr sz="2000" kern="1200">
+                <a:solidFill>
+                  <a:schemeClr val="tx1"/>
+                </a:solidFill>
+                <a:latin typeface="+mn-lt"/>
+                <a:ea typeface="+mn-ea"/>
+                <a:cs typeface="+mn-cs"/>
+              </a:defRPr>
+            </a:lvl2pPr>
+            <a:lvl3pPr marL="1143000" indent="-228600" algn="l" defTabSz="914400" rtl="0" eaLnBrk="1" latinLnBrk="0" hangingPunct="1">
+              <a:lnSpc>
+                <a:spcPct val="90000"/>
+              </a:lnSpc>
+              <a:spcBef>
+                <a:spcPts val="500"/>
+              </a:spcBef>
+              <a:buFont typeface="Arial" panose="020B0604020202020204" pitchFamily="34" charset="0"/>
+              <a:buChar char="•"/>
+              <a:defRPr sz="1800" kern="1200">
+                <a:solidFill>
+                  <a:schemeClr val="tx1"/>
+                </a:solidFill>
+                <a:latin typeface="+mn-lt"/>
+                <a:ea typeface="+mn-ea"/>
+                <a:cs typeface="+mn-cs"/>
+              </a:defRPr>
+            </a:lvl3pPr>
+            <a:lvl4pPr marL="1600200" indent="-228600" algn="l" defTabSz="914400" rtl="0" eaLnBrk="1" latinLnBrk="0" hangingPunct="1">
+              <a:lnSpc>
+                <a:spcPct val="90000"/>
+              </a:lnSpc>
+              <a:spcBef>
+                <a:spcPts val="500"/>
+              </a:spcBef>
+              <a:buFont typeface="Arial" panose="020B0604020202020204" pitchFamily="34" charset="0"/>
+              <a:buChar char="•"/>
+              <a:defRPr sz="1600" kern="1200">
+                <a:solidFill>
+                  <a:schemeClr val="tx1"/>
+                </a:solidFill>
+                <a:latin typeface="+mn-lt"/>
+                <a:ea typeface="+mn-ea"/>
+                <a:cs typeface="+mn-cs"/>
+              </a:defRPr>
+            </a:lvl4pPr>
+            <a:lvl5pPr marL="2057400" indent="-228600" algn="l" defTabSz="914400" rtl="0" eaLnBrk="1" latinLnBrk="0" hangingPunct="1">
+              <a:lnSpc>
+                <a:spcPct val="90000"/>
+              </a:lnSpc>
+              <a:spcBef>
+                <a:spcPts val="500"/>
+              </a:spcBef>
+              <a:buFont typeface="Arial" panose="020B0604020202020204" pitchFamily="34" charset="0"/>
+              <a:buChar char="•"/>
+              <a:defRPr sz="1600" kern="1200">
+                <a:solidFill>
+                  <a:schemeClr val="tx1"/>
+                </a:solidFill>
+                <a:latin typeface="+mn-lt"/>
+                <a:ea typeface="+mn-ea"/>
+                <a:cs typeface="+mn-cs"/>
+              </a:defRPr>
+            </a:lvl5pPr>
+            <a:lvl6pPr marL="2514600" indent="-228600" algn="l" defTabSz="914400" rtl="0" eaLnBrk="1" latinLnBrk="0" hangingPunct="1">
+              <a:lnSpc>
+                <a:spcPct val="90000"/>
+              </a:lnSpc>
+              <a:spcBef>
+                <a:spcPts val="500"/>
+              </a:spcBef>
+              <a:buFont typeface="Arial" panose="020B0604020202020204" pitchFamily="34" charset="0"/>
+              <a:buChar char="•"/>
+              <a:defRPr sz="1600" kern="1200">
+                <a:solidFill>
+                  <a:schemeClr val="tx1"/>
+                </a:solidFill>
+                <a:latin typeface="+mn-lt"/>
+                <a:ea typeface="+mn-ea"/>
+                <a:cs typeface="+mn-cs"/>
+              </a:defRPr>
+            </a:lvl6pPr>
+            <a:lvl7pPr marL="2971800" indent="-228600" algn="l" defTabSz="914400" rtl="0" eaLnBrk="1" latinLnBrk="0" hangingPunct="1">
+              <a:lnSpc>
+                <a:spcPct val="90000"/>
+              </a:lnSpc>
+              <a:spcBef>
+                <a:spcPts val="500"/>
+              </a:spcBef>
+              <a:buFont typeface="Arial" panose="020B0604020202020204" pitchFamily="34" charset="0"/>
+              <a:buChar char="•"/>
+              <a:defRPr sz="1600" kern="1200">
+                <a:solidFill>
+                  <a:schemeClr val="tx1"/>
+                </a:solidFill>
+                <a:latin typeface="+mn-lt"/>
+                <a:ea typeface="+mn-ea"/>
+                <a:cs typeface="+mn-cs"/>
+              </a:defRPr>
+            </a:lvl7pPr>
+            <a:lvl8pPr marL="3429000" indent="-228600" algn="l" defTabSz="914400" rtl="0" eaLnBrk="1" latinLnBrk="0" hangingPunct="1">
+              <a:lnSpc>
+                <a:spcPct val="90000"/>
+              </a:lnSpc>
+              <a:spcBef>
+                <a:spcPts val="500"/>
+              </a:spcBef>
+              <a:buFont typeface="Arial" panose="020B0604020202020204" pitchFamily="34" charset="0"/>
+              <a:buChar char="•"/>
+              <a:defRPr sz="1600" kern="1200">
+                <a:solidFill>
+                  <a:schemeClr val="tx1"/>
+                </a:solidFill>
+                <a:latin typeface="+mn-lt"/>
+                <a:ea typeface="+mn-ea"/>
+                <a:cs typeface="+mn-cs"/>
+              </a:defRPr>
+            </a:lvl8pPr>
+            <a:lvl9pPr marL="3886200" indent="-228600" algn="l" defTabSz="914400" rtl="0" eaLnBrk="1" latinLnBrk="0" hangingPunct="1">
+              <a:lnSpc>
+                <a:spcPct val="90000"/>
+              </a:lnSpc>
+              <a:spcBef>
+                <a:spcPts val="500"/>
+              </a:spcBef>
+              <a:buFont typeface="Arial" panose="020B0604020202020204" pitchFamily="34" charset="0"/>
+              <a:buChar char="•"/>
+              <a:defRPr sz="1600" kern="1200">
+                <a:solidFill>
+                  <a:schemeClr val="tx1"/>
+                </a:solidFill>
+                <a:latin typeface="+mn-lt"/>
+                <a:ea typeface="+mn-ea"/>
+                <a:cs typeface="+mn-cs"/>
+              </a:defRPr>
+            </a:lvl9pPr>
+          </a:lstStyle>
+          <a:p>
+            <a:pPr marL="0" indent="0">
+              <a:buNone/>
+            </a:pPr>
+            <a:r>
+              <a:rPr lang="en-GB" sz="4400" dirty="0"/>
+              <a:t>Any questions?</a:t>
+            </a:r>
           </a:p>
         </p:txBody>
       </p:sp>

</xml_diff>

<commit_message>
updated results slides with hypothesis test
</commit_message>
<xml_diff>
--- a/Presentation/PHS Rshiny Team Klas.pptx
+++ b/Presentation/PHS Rshiny Team Klas.pptx
@@ -5,7 +5,7 @@
     <p:sldMasterId id="2147483648" r:id="rId1"/>
   </p:sldMasterIdLst>
   <p:notesMasterIdLst>
-    <p:notesMasterId r:id="rId13"/>
+    <p:notesMasterId r:id="rId14"/>
   </p:notesMasterIdLst>
   <p:sldIdLst>
     <p:sldId id="256" r:id="rId2"/>
@@ -18,7 +18,8 @@
     <p:sldId id="267" r:id="rId9"/>
     <p:sldId id="265" r:id="rId10"/>
     <p:sldId id="268" r:id="rId11"/>
-    <p:sldId id="266" r:id="rId12"/>
+    <p:sldId id="269" r:id="rId12"/>
+    <p:sldId id="266" r:id="rId13"/>
   </p:sldIdLst>
   <p:sldSz cx="12192000" cy="6858000"/>
   <p:notesSz cx="6858000" cy="9144000"/>
@@ -6478,7 +6479,7 @@
           <a:p>
             <a:fld id="{24D6E255-0C17-194D-89AA-82B24F597BBC}" type="datetimeFigureOut">
               <a:rPr lang="en-US" smtClean="0"/>
-              <a:t>2/3/22</a:t>
+              <a:t>2/3/2022</a:t>
             </a:fld>
             <a:endParaRPr lang="en-US"/>
           </a:p>
@@ -7609,7 +7610,7 @@
           <a:p>
             <a:fld id="{48A87A34-81AB-432B-8DAE-1953F412C126}" type="datetimeFigureOut">
               <a:rPr lang="en-US" dirty="0"/>
-              <a:t>2/3/22</a:t>
+              <a:t>2/3/2022</a:t>
             </a:fld>
             <a:endParaRPr lang="en-US" dirty="0"/>
           </a:p>
@@ -7871,7 +7872,7 @@
           <a:p>
             <a:fld id="{48A87A34-81AB-432B-8DAE-1953F412C126}" type="datetimeFigureOut">
               <a:rPr lang="en-US" dirty="0"/>
-              <a:t>2/3/22</a:t>
+              <a:t>2/3/2022</a:t>
             </a:fld>
             <a:endParaRPr lang="en-US" dirty="0"/>
           </a:p>
@@ -8098,7 +8099,7 @@
             <a:fld id="{48A87A34-81AB-432B-8DAE-1953F412C126}" type="datetimeFigureOut">
               <a:rPr lang="en-US" dirty="0"/>
               <a:pPr/>
-              <a:t>2/3/22</a:t>
+              <a:t>2/3/2022</a:t>
             </a:fld>
             <a:endParaRPr lang="en-US" dirty="0"/>
           </a:p>
@@ -8404,7 +8405,7 @@
             <a:fld id="{48A87A34-81AB-432B-8DAE-1953F412C126}" type="datetimeFigureOut">
               <a:rPr lang="en-US" dirty="0"/>
               <a:pPr/>
-              <a:t>2/3/22</a:t>
+              <a:t>2/3/2022</a:t>
             </a:fld>
             <a:endParaRPr lang="en-US" dirty="0"/>
           </a:p>
@@ -8873,7 +8874,7 @@
             <a:fld id="{48A87A34-81AB-432B-8DAE-1953F412C126}" type="datetimeFigureOut">
               <a:rPr lang="en-US" dirty="0"/>
               <a:pPr/>
-              <a:t>2/3/22</a:t>
+              <a:t>2/3/2022</a:t>
             </a:fld>
             <a:endParaRPr lang="en-US" dirty="0"/>
           </a:p>
@@ -9415,7 +9416,7 @@
           <a:p>
             <a:fld id="{48A87A34-81AB-432B-8DAE-1953F412C126}" type="datetimeFigureOut">
               <a:rPr lang="en-US" dirty="0"/>
-              <a:t>2/3/22</a:t>
+              <a:t>2/3/2022</a:t>
             </a:fld>
             <a:endParaRPr lang="en-US" dirty="0"/>
           </a:p>
@@ -10184,7 +10185,7 @@
           <a:p>
             <a:fld id="{48A87A34-81AB-432B-8DAE-1953F412C126}" type="datetimeFigureOut">
               <a:rPr lang="en-US" dirty="0"/>
-              <a:t>2/3/22</a:t>
+              <a:t>2/3/2022</a:t>
             </a:fld>
             <a:endParaRPr lang="en-US" dirty="0"/>
           </a:p>
@@ -10354,7 +10355,7 @@
           <a:p>
             <a:fld id="{48A87A34-81AB-432B-8DAE-1953F412C126}" type="datetimeFigureOut">
               <a:rPr lang="en-US" dirty="0"/>
-              <a:t>2/3/22</a:t>
+              <a:t>2/3/2022</a:t>
             </a:fld>
             <a:endParaRPr lang="en-US" dirty="0"/>
           </a:p>
@@ -10573,7 +10574,7 @@
             <a:fld id="{48A87A34-81AB-432B-8DAE-1953F412C126}" type="datetimeFigureOut">
               <a:rPr lang="en-US" dirty="0"/>
               <a:pPr/>
-              <a:t>2/3/22</a:t>
+              <a:t>2/3/2022</a:t>
             </a:fld>
             <a:endParaRPr lang="en-US" dirty="0"/>
           </a:p>
@@ -10756,7 +10757,7 @@
           <a:p>
             <a:fld id="{48A87A34-81AB-432B-8DAE-1953F412C126}" type="datetimeFigureOut">
               <a:rPr lang="en-US" dirty="0"/>
-              <a:t>2/3/22</a:t>
+              <a:t>2/3/2022</a:t>
             </a:fld>
             <a:endParaRPr lang="en-US" dirty="0"/>
           </a:p>
@@ -11041,7 +11042,7 @@
             <a:fld id="{48A87A34-81AB-432B-8DAE-1953F412C126}" type="datetimeFigureOut">
               <a:rPr lang="en-US" dirty="0"/>
               <a:pPr/>
-              <a:t>2/3/22</a:t>
+              <a:t>2/3/2022</a:t>
             </a:fld>
             <a:endParaRPr lang="en-US" dirty="0"/>
           </a:p>
@@ -11278,7 +11279,7 @@
           <a:p>
             <a:fld id="{48A87A34-81AB-432B-8DAE-1953F412C126}" type="datetimeFigureOut">
               <a:rPr lang="en-US" dirty="0"/>
-              <a:t>2/3/22</a:t>
+              <a:t>2/3/2022</a:t>
             </a:fld>
             <a:endParaRPr lang="en-US" dirty="0"/>
           </a:p>
@@ -11652,7 +11653,7 @@
           <a:p>
             <a:fld id="{48A87A34-81AB-432B-8DAE-1953F412C126}" type="datetimeFigureOut">
               <a:rPr lang="en-US" dirty="0"/>
-              <a:t>2/3/22</a:t>
+              <a:t>2/3/2022</a:t>
             </a:fld>
             <a:endParaRPr lang="en-US" dirty="0"/>
           </a:p>
@@ -11765,7 +11766,7 @@
           <a:p>
             <a:fld id="{48A87A34-81AB-432B-8DAE-1953F412C126}" type="datetimeFigureOut">
               <a:rPr lang="en-US" dirty="0"/>
-              <a:t>2/3/22</a:t>
+              <a:t>2/3/2022</a:t>
             </a:fld>
             <a:endParaRPr lang="en-US" dirty="0"/>
           </a:p>
@@ -11855,7 +11856,7 @@
           <a:p>
             <a:fld id="{48A87A34-81AB-432B-8DAE-1953F412C126}" type="datetimeFigureOut">
               <a:rPr lang="en-US" dirty="0"/>
-              <a:t>2/3/22</a:t>
+              <a:t>2/3/2022</a:t>
             </a:fld>
             <a:endParaRPr lang="en-US" dirty="0"/>
           </a:p>
@@ -12099,7 +12100,7 @@
           <a:p>
             <a:fld id="{48A87A34-81AB-432B-8DAE-1953F412C126}" type="datetimeFigureOut">
               <a:rPr lang="en-US" dirty="0"/>
-              <a:t>2/3/22</a:t>
+              <a:t>2/3/2022</a:t>
             </a:fld>
             <a:endParaRPr lang="en-US" dirty="0"/>
           </a:p>
@@ -12351,7 +12352,7 @@
           <a:p>
             <a:fld id="{48A87A34-81AB-432B-8DAE-1953F412C126}" type="datetimeFigureOut">
               <a:rPr lang="en-US" dirty="0"/>
-              <a:t>2/3/22</a:t>
+              <a:t>2/3/2022</a:t>
             </a:fld>
             <a:endParaRPr lang="en-US" dirty="0"/>
           </a:p>
@@ -12590,7 +12591,7 @@
             <a:fld id="{48A87A34-81AB-432B-8DAE-1953F412C126}" type="datetimeFigureOut">
               <a:rPr lang="en-US" dirty="0"/>
               <a:pPr/>
-              <a:t>2/3/22</a:t>
+              <a:t>2/3/2022</a:t>
             </a:fld>
             <a:endParaRPr lang="en-US" dirty="0"/>
           </a:p>
@@ -14050,6 +14051,1790 @@
 </file>
 
 <file path=ppt/slides/slide11.xml><?xml version="1.0" encoding="utf-8"?>
+<p:sld xmlns:a="http://schemas.openxmlformats.org/drawingml/2006/main" xmlns:r="http://schemas.openxmlformats.org/officeDocument/2006/relationships" xmlns:p="http://schemas.openxmlformats.org/presentationml/2006/main">
+  <p:cSld>
+    <p:spTree>
+      <p:nvGrpSpPr>
+        <p:cNvPr id="1" name=""/>
+        <p:cNvGrpSpPr/>
+        <p:nvPr/>
+      </p:nvGrpSpPr>
+      <p:grpSpPr>
+        <a:xfrm>
+          <a:off x="0" y="0"/>
+          <a:ext cx="0" cy="0"/>
+          <a:chOff x="0" y="0"/>
+          <a:chExt cx="0" cy="0"/>
+        </a:xfrm>
+      </p:grpSpPr>
+      <p:sp>
+        <p:nvSpPr>
+          <p:cNvPr id="2" name="Title 1">
+            <a:extLst>
+              <a:ext uri="{FF2B5EF4-FFF2-40B4-BE49-F238E27FC236}">
+                <a16:creationId xmlns:a16="http://schemas.microsoft.com/office/drawing/2014/main" id="{1E032129-E5B2-453A-A9EE-89C87660BA71}"/>
+              </a:ext>
+            </a:extLst>
+          </p:cNvPr>
+          <p:cNvSpPr txBox="1">
+            <a:spLocks/>
+          </p:cNvSpPr>
+          <p:nvPr/>
+        </p:nvSpPr>
+        <p:spPr>
+          <a:xfrm>
+            <a:off x="927315" y="609390"/>
+            <a:ext cx="8610600" cy="1293028"/>
+          </a:xfrm>
+          <a:prstGeom prst="rect">
+            <a:avLst/>
+          </a:prstGeom>
+        </p:spPr>
+        <p:txBody>
+          <a:bodyPr>
+            <a:normAutofit/>
+          </a:bodyPr>
+          <a:lstStyle>
+            <a:lvl1pPr algn="r" defTabSz="914400" rtl="0" eaLnBrk="1" latinLnBrk="0" hangingPunct="1">
+              <a:lnSpc>
+                <a:spcPct val="90000"/>
+              </a:lnSpc>
+              <a:spcBef>
+                <a:spcPct val="0"/>
+              </a:spcBef>
+              <a:buNone/>
+              <a:defRPr sz="4000" kern="1200" cap="all" baseline="0">
+                <a:solidFill>
+                  <a:schemeClr val="tx1"/>
+                </a:solidFill>
+                <a:latin typeface="+mj-lt"/>
+                <a:ea typeface="+mj-ea"/>
+                <a:cs typeface="+mj-cs"/>
+              </a:defRPr>
+            </a:lvl1pPr>
+          </a:lstStyle>
+          <a:p>
+            <a:pPr algn="l"/>
+            <a:r>
+              <a:rPr lang="en-US" b="1" dirty="0">
+                <a:solidFill>
+                  <a:schemeClr val="bg2"/>
+                </a:solidFill>
+              </a:rPr>
+              <a:t>results</a:t>
+            </a:r>
+            <a:endParaRPr lang="en-US" dirty="0"/>
+          </a:p>
+        </p:txBody>
+      </p:sp>
+      <mc:AlternateContent xmlns:mc="http://schemas.openxmlformats.org/markup-compatibility/2006">
+        <mc:Choice xmlns:a14="http://schemas.microsoft.com/office/drawing/2010/main" Requires="a14">
+          <p:graphicFrame>
+            <p:nvGraphicFramePr>
+              <p:cNvPr id="4" name="Table 4">
+                <a:extLst>
+                  <a:ext uri="{FF2B5EF4-FFF2-40B4-BE49-F238E27FC236}">
+                    <a16:creationId xmlns:a16="http://schemas.microsoft.com/office/drawing/2014/main" id="{296AA3D8-87CF-4B3A-9AF6-5324AA89F96A}"/>
+                  </a:ext>
+                </a:extLst>
+              </p:cNvPr>
+              <p:cNvGraphicFramePr>
+                <a:graphicFrameLocks/>
+              </p:cNvGraphicFramePr>
+              <p:nvPr>
+                <p:extLst>
+                  <p:ext uri="{D42A27DB-BD31-4B8C-83A1-F6EECF244321}">
+                    <p14:modId xmlns:p14="http://schemas.microsoft.com/office/powerpoint/2010/main" val="2241294273"/>
+                  </p:ext>
+                </p:extLst>
+              </p:nvPr>
+            </p:nvGraphicFramePr>
+            <p:xfrm>
+              <a:off x="1148751" y="2079711"/>
+              <a:ext cx="9894498" cy="4015643"/>
+            </p:xfrm>
+            <a:graphic>
+              <a:graphicData uri="http://schemas.openxmlformats.org/drawingml/2006/table">
+                <a:tbl>
+                  <a:tblPr firstRow="1" bandRow="1">
+                    <a:tableStyleId>{5C22544A-7EE6-4342-B048-85BDC9FD1C3A}</a:tableStyleId>
+                  </a:tblPr>
+                  <a:tblGrid>
+                    <a:gridCol w="1753409">
+                      <a:extLst>
+                        <a:ext uri="{9D8B030D-6E8A-4147-A177-3AD203B41FA5}">
+                          <a16:colId xmlns:a16="http://schemas.microsoft.com/office/drawing/2014/main" val="2480767501"/>
+                        </a:ext>
+                      </a:extLst>
+                    </a:gridCol>
+                    <a:gridCol w="4042104">
+                      <a:extLst>
+                        <a:ext uri="{9D8B030D-6E8A-4147-A177-3AD203B41FA5}">
+                          <a16:colId xmlns:a16="http://schemas.microsoft.com/office/drawing/2014/main" val="2220793226"/>
+                        </a:ext>
+                      </a:extLst>
+                    </a:gridCol>
+                    <a:gridCol w="4098985">
+                      <a:extLst>
+                        <a:ext uri="{9D8B030D-6E8A-4147-A177-3AD203B41FA5}">
+                          <a16:colId xmlns:a16="http://schemas.microsoft.com/office/drawing/2014/main" val="3967160999"/>
+                        </a:ext>
+                      </a:extLst>
+                    </a:gridCol>
+                  </a:tblGrid>
+                  <a:tr h="674527">
+                    <a:tc>
+                      <a:txBody>
+                        <a:bodyPr/>
+                        <a:lstStyle/>
+                        <a:p>
+                          <a:r>
+                            <a:rPr lang="en-GB" dirty="0"/>
+                            <a:t>Index</a:t>
+                          </a:r>
+                        </a:p>
+                      </a:txBody>
+                      <a:tcPr>
+                        <a:solidFill>
+                          <a:srgbClr val="222323"/>
+                        </a:solidFill>
+                      </a:tcPr>
+                    </a:tc>
+                    <a:tc>
+                      <a:txBody>
+                        <a:bodyPr/>
+                        <a:lstStyle/>
+                        <a:p>
+                          <a:r>
+                            <a:rPr lang="en-GB" dirty="0"/>
+                            <a:t>Covid Impact on hospital Activity</a:t>
+                          </a:r>
+                        </a:p>
+                      </a:txBody>
+                      <a:tcPr>
+                        <a:solidFill>
+                          <a:srgbClr val="222323"/>
+                        </a:solidFill>
+                      </a:tcPr>
+                    </a:tc>
+                    <a:tc>
+                      <a:txBody>
+                        <a:bodyPr/>
+                        <a:lstStyle/>
+                        <a:p>
+                          <a:r>
+                            <a:rPr lang="en-GB" dirty="0"/>
+                            <a:t>Winter Impact on Hospital Activity</a:t>
+                          </a:r>
+                        </a:p>
+                      </a:txBody>
+                      <a:tcPr>
+                        <a:solidFill>
+                          <a:srgbClr val="222323"/>
+                        </a:solidFill>
+                      </a:tcPr>
+                    </a:tc>
+                    <a:extLst>
+                      <a:ext uri="{0D108BD9-81ED-4DB2-BD59-A6C34878D82A}">
+                        <a16:rowId xmlns:a16="http://schemas.microsoft.com/office/drawing/2014/main" val="3295140544"/>
+                      </a:ext>
+                    </a:extLst>
+                  </a:tr>
+                  <a:tr h="1349225">
+                    <a:tc>
+                      <a:txBody>
+                        <a:bodyPr/>
+                        <a:lstStyle/>
+                        <a:p>
+                          <a:pPr marL="0" marR="0" lvl="0" indent="0" algn="l" defTabSz="914400" rtl="0" eaLnBrk="1" fontAlgn="auto" latinLnBrk="0" hangingPunct="1">
+                            <a:lnSpc>
+                              <a:spcPct val="100000"/>
+                            </a:lnSpc>
+                            <a:spcBef>
+                              <a:spcPts val="0"/>
+                            </a:spcBef>
+                            <a:spcAft>
+                              <a:spcPts val="0"/>
+                            </a:spcAft>
+                            <a:buClrTx/>
+                            <a:buSzTx/>
+                            <a:buFontTx/>
+                            <a:buNone/>
+                            <a:tabLst/>
+                            <a:defRPr/>
+                          </a:pPr>
+                          <a:r>
+                            <a:rPr lang="en-GB" sz="1800" b="1" i="0" kern="1200" dirty="0">
+                              <a:solidFill>
+                                <a:schemeClr val="dk1"/>
+                              </a:solidFill>
+                              <a:effectLst/>
+                              <a:latin typeface="+mn-lt"/>
+                              <a:ea typeface="+mn-ea"/>
+                              <a:cs typeface="+mn-cs"/>
+                            </a:rPr>
+                            <a:t>Setup:</a:t>
+                          </a:r>
+                        </a:p>
+                      </a:txBody>
+                      <a:tcPr/>
+                    </a:tc>
+                    <a:tc>
+                      <a:txBody>
+                        <a:bodyPr/>
+                        <a:lstStyle/>
+                        <a:p>
+                          <a:r>
+                            <a:rPr lang="el-GR" sz="1800" b="1" i="0" kern="1200" dirty="0">
+                              <a:solidFill>
+                                <a:schemeClr val="dk1"/>
+                              </a:solidFill>
+                              <a:effectLst/>
+                              <a:latin typeface="+mn-lt"/>
+                              <a:ea typeface="+mn-ea"/>
+                              <a:cs typeface="+mn-cs"/>
+                            </a:rPr>
+                            <a:t>α</a:t>
+                          </a:r>
+                          <a:r>
+                            <a:rPr lang="en-GB" sz="1800" b="1" i="0" kern="1200" dirty="0">
+                              <a:solidFill>
+                                <a:schemeClr val="dk1"/>
+                              </a:solidFill>
+                              <a:effectLst/>
+                              <a:latin typeface="+mn-lt"/>
+                              <a:ea typeface="+mn-ea"/>
+                              <a:cs typeface="+mn-cs"/>
+                            </a:rPr>
+                            <a:t> = 0.05</a:t>
+                          </a:r>
+                          <a:endParaRPr lang="en-GB" sz="1800" b="1" i="1" kern="1200" dirty="0">
+                            <a:solidFill>
+                              <a:schemeClr val="dk1"/>
+                            </a:solidFill>
+                            <a:effectLst/>
+                            <a:latin typeface="Cambria Math" panose="02040503050406030204" pitchFamily="18" charset="0"/>
+                            <a:ea typeface="+mn-ea"/>
+                            <a:cs typeface="+mn-cs"/>
+                          </a:endParaRPr>
+                        </a:p>
+                        <a:p>
+                          <a14:m>
+                            <m:oMath xmlns:m="http://schemas.openxmlformats.org/officeDocument/2006/math">
+                              <m:sSub>
+                                <m:sSubPr>
+                                  <m:ctrlPr>
+                                    <a:rPr lang="en-GB" sz="1800" b="1" i="1" kern="1200" smtClean="0">
+                                      <a:solidFill>
+                                        <a:schemeClr val="dk1"/>
+                                      </a:solidFill>
+                                      <a:effectLst/>
+                                      <a:latin typeface="Cambria Math" panose="02040503050406030204" pitchFamily="18" charset="0"/>
+                                      <a:ea typeface="+mn-ea"/>
+                                      <a:cs typeface="+mn-cs"/>
+                                    </a:rPr>
+                                  </m:ctrlPr>
+                                </m:sSubPr>
+                                <m:e>
+                                  <m:r>
+                                    <a:rPr lang="en-GB" sz="1800" b="1" i="1" kern="1200" smtClean="0">
+                                      <a:solidFill>
+                                        <a:schemeClr val="dk1"/>
+                                      </a:solidFill>
+                                      <a:effectLst/>
+                                      <a:latin typeface="Cambria Math" panose="02040503050406030204" pitchFamily="18" charset="0"/>
+                                      <a:ea typeface="+mn-ea"/>
+                                      <a:cs typeface="+mn-cs"/>
+                                    </a:rPr>
+                                    <m:t>𝑯</m:t>
+                                  </m:r>
+                                </m:e>
+                                <m:sub>
+                                  <m:r>
+                                    <a:rPr lang="en-GB" sz="1800" b="1" i="1" kern="1200" smtClean="0">
+                                      <a:solidFill>
+                                        <a:schemeClr val="dk1"/>
+                                      </a:solidFill>
+                                      <a:effectLst/>
+                                      <a:latin typeface="Cambria Math" panose="02040503050406030204" pitchFamily="18" charset="0"/>
+                                      <a:ea typeface="+mn-ea"/>
+                                      <a:cs typeface="+mn-cs"/>
+                                    </a:rPr>
+                                    <m:t>𝟎</m:t>
+                                  </m:r>
+                                </m:sub>
+                              </m:sSub>
+                              <m:r>
+                                <a:rPr lang="en-GB" sz="1800" b="1" i="1" kern="1200" smtClean="0">
+                                  <a:solidFill>
+                                    <a:schemeClr val="dk1"/>
+                                  </a:solidFill>
+                                  <a:effectLst/>
+                                  <a:latin typeface="Cambria Math" panose="02040503050406030204" pitchFamily="18" charset="0"/>
+                                  <a:ea typeface="+mn-ea"/>
+                                  <a:cs typeface="+mn-cs"/>
+                                </a:rPr>
+                                <m:t>=</m:t>
+                              </m:r>
+                              <m:sSub>
+                                <m:sSubPr>
+                                  <m:ctrlPr>
+                                    <a:rPr lang="en-GB" sz="1800" b="1" i="1" kern="1200" smtClean="0">
+                                      <a:solidFill>
+                                        <a:schemeClr val="dk1"/>
+                                      </a:solidFill>
+                                      <a:effectLst/>
+                                      <a:latin typeface="Cambria Math" panose="02040503050406030204" pitchFamily="18" charset="0"/>
+                                      <a:ea typeface="+mn-ea"/>
+                                      <a:cs typeface="+mn-cs"/>
+                                    </a:rPr>
+                                  </m:ctrlPr>
+                                </m:sSubPr>
+                                <m:e>
+                                  <m:r>
+                                    <a:rPr lang="en-GB" sz="1800" b="1" i="1" kern="1200" smtClean="0">
+                                      <a:solidFill>
+                                        <a:schemeClr val="dk1"/>
+                                      </a:solidFill>
+                                      <a:effectLst/>
+                                      <a:latin typeface="Cambria Math" panose="02040503050406030204" pitchFamily="18" charset="0"/>
+                                      <a:ea typeface="Cambria Math" panose="02040503050406030204" pitchFamily="18" charset="0"/>
+                                      <a:cs typeface="+mn-cs"/>
+                                    </a:rPr>
+                                    <m:t>𝝁</m:t>
+                                  </m:r>
+                                </m:e>
+                                <m:sub>
+                                  <m:r>
+                                    <a:rPr lang="en-GB" sz="1800" b="1" i="1" kern="1200" smtClean="0">
+                                      <a:solidFill>
+                                        <a:schemeClr val="dk1"/>
+                                      </a:solidFill>
+                                      <a:effectLst/>
+                                      <a:latin typeface="Cambria Math" panose="02040503050406030204" pitchFamily="18" charset="0"/>
+                                      <a:ea typeface="+mn-ea"/>
+                                      <a:cs typeface="+mn-cs"/>
+                                    </a:rPr>
+                                    <m:t>𝒄𝒐𝒗</m:t>
+                                  </m:r>
+                                </m:sub>
+                              </m:sSub>
+                            </m:oMath>
+                          </a14:m>
+                          <a:r>
+                            <a:rPr lang="en-GB" sz="1800" b="1" i="0" kern="1200" dirty="0">
+                              <a:solidFill>
+                                <a:schemeClr val="dk1"/>
+                              </a:solidFill>
+                              <a:effectLst/>
+                              <a:latin typeface="+mn-lt"/>
+                              <a:ea typeface="+mn-ea"/>
+                              <a:cs typeface="+mn-cs"/>
+                            </a:rPr>
+                            <a:t>-</a:t>
+                          </a:r>
+                          <a14:m>
+                            <m:oMath xmlns:m="http://schemas.openxmlformats.org/officeDocument/2006/math">
+                              <m:r>
+                                <a:rPr lang="en-GB" sz="1800" b="1" i="0" kern="1200" smtClean="0">
+                                  <a:solidFill>
+                                    <a:schemeClr val="dk1"/>
+                                  </a:solidFill>
+                                  <a:effectLst/>
+                                  <a:latin typeface="Cambria Math" panose="02040503050406030204" pitchFamily="18" charset="0"/>
+                                  <a:ea typeface="+mn-ea"/>
+                                  <a:cs typeface="+mn-cs"/>
+                                </a:rPr>
+                                <m:t> </m:t>
+                              </m:r>
+                              <m:sSub>
+                                <m:sSubPr>
+                                  <m:ctrlPr>
+                                    <a:rPr lang="en-GB" sz="1800" b="1" i="1" kern="1200" smtClean="0">
+                                      <a:solidFill>
+                                        <a:schemeClr val="dk1"/>
+                                      </a:solidFill>
+                                      <a:effectLst/>
+                                      <a:latin typeface="Cambria Math" panose="02040503050406030204" pitchFamily="18" charset="0"/>
+                                      <a:ea typeface="+mn-ea"/>
+                                      <a:cs typeface="+mn-cs"/>
+                                    </a:rPr>
+                                  </m:ctrlPr>
+                                </m:sSubPr>
+                                <m:e>
+                                  <m:r>
+                                    <a:rPr lang="en-GB" sz="1800" b="1" i="1" kern="1200" smtClean="0">
+                                      <a:solidFill>
+                                        <a:schemeClr val="dk1"/>
+                                      </a:solidFill>
+                                      <a:effectLst/>
+                                      <a:latin typeface="Cambria Math" panose="02040503050406030204" pitchFamily="18" charset="0"/>
+                                      <a:ea typeface="Cambria Math" panose="02040503050406030204" pitchFamily="18" charset="0"/>
+                                      <a:cs typeface="+mn-cs"/>
+                                    </a:rPr>
+                                    <m:t>𝝁</m:t>
+                                  </m:r>
+                                </m:e>
+                                <m:sub>
+                                  <m:r>
+                                    <a:rPr lang="en-GB" sz="1800" b="1" i="1" kern="1200" smtClean="0">
+                                      <a:solidFill>
+                                        <a:schemeClr val="dk1"/>
+                                      </a:solidFill>
+                                      <a:effectLst/>
+                                      <a:latin typeface="Cambria Math" panose="02040503050406030204" pitchFamily="18" charset="0"/>
+                                      <a:ea typeface="+mn-ea"/>
+                                      <a:cs typeface="+mn-cs"/>
+                                    </a:rPr>
+                                    <m:t>𝒑𝒓𝒆𝒄𝒐𝒗</m:t>
+                                  </m:r>
+                                </m:sub>
+                              </m:sSub>
+                            </m:oMath>
+                          </a14:m>
+                          <a:r>
+                            <a:rPr lang="en-GB" sz="1800" b="1" i="0" kern="1200" dirty="0">
+                              <a:solidFill>
+                                <a:schemeClr val="dk1"/>
+                              </a:solidFill>
+                              <a:effectLst/>
+                              <a:latin typeface="+mn-lt"/>
+                              <a:ea typeface="+mn-ea"/>
+                              <a:cs typeface="+mn-cs"/>
+                            </a:rPr>
+                            <a:t> = 0</a:t>
+                          </a:r>
+                        </a:p>
+                        <a:p>
+                          <a:pPr marL="0" marR="0" lvl="0" indent="0" algn="l" defTabSz="914400" rtl="0" eaLnBrk="1" fontAlgn="auto" latinLnBrk="0" hangingPunct="1">
+                            <a:lnSpc>
+                              <a:spcPct val="100000"/>
+                            </a:lnSpc>
+                            <a:spcBef>
+                              <a:spcPts val="0"/>
+                            </a:spcBef>
+                            <a:spcAft>
+                              <a:spcPts val="0"/>
+                            </a:spcAft>
+                            <a:buClrTx/>
+                            <a:buSzTx/>
+                            <a:buFontTx/>
+                            <a:buNone/>
+                            <a:tabLst/>
+                            <a:defRPr/>
+                          </a:pPr>
+                          <a14:m>
+                            <m:oMath xmlns:m="http://schemas.openxmlformats.org/officeDocument/2006/math">
+                              <m:sSub>
+                                <m:sSubPr>
+                                  <m:ctrlPr>
+                                    <a:rPr lang="en-GB" sz="1800" b="1" i="1" kern="1200" smtClean="0">
+                                      <a:solidFill>
+                                        <a:schemeClr val="dk1"/>
+                                      </a:solidFill>
+                                      <a:effectLst/>
+                                      <a:latin typeface="Cambria Math" panose="02040503050406030204" pitchFamily="18" charset="0"/>
+                                      <a:ea typeface="+mn-ea"/>
+                                      <a:cs typeface="+mn-cs"/>
+                                    </a:rPr>
+                                  </m:ctrlPr>
+                                </m:sSubPr>
+                                <m:e>
+                                  <m:r>
+                                    <a:rPr lang="en-GB" sz="1800" b="1" i="1" kern="1200" smtClean="0">
+                                      <a:solidFill>
+                                        <a:schemeClr val="dk1"/>
+                                      </a:solidFill>
+                                      <a:effectLst/>
+                                      <a:latin typeface="Cambria Math" panose="02040503050406030204" pitchFamily="18" charset="0"/>
+                                      <a:ea typeface="+mn-ea"/>
+                                      <a:cs typeface="+mn-cs"/>
+                                    </a:rPr>
+                                    <m:t>𝑯</m:t>
+                                  </m:r>
+                                </m:e>
+                                <m:sub>
+                                  <m:r>
+                                    <a:rPr lang="en-GB" sz="1800" b="1" i="1" kern="1200" smtClean="0">
+                                      <a:solidFill>
+                                        <a:schemeClr val="dk1"/>
+                                      </a:solidFill>
+                                      <a:effectLst/>
+                                      <a:latin typeface="Cambria Math" panose="02040503050406030204" pitchFamily="18" charset="0"/>
+                                      <a:ea typeface="Cambria Math" panose="02040503050406030204" pitchFamily="18" charset="0"/>
+                                      <a:cs typeface="+mn-cs"/>
+                                    </a:rPr>
+                                    <m:t>𝜶</m:t>
+                                  </m:r>
+                                </m:sub>
+                              </m:sSub>
+                              <m:r>
+                                <a:rPr lang="en-GB" sz="1800" b="1" i="1" kern="1200" smtClean="0">
+                                  <a:solidFill>
+                                    <a:schemeClr val="dk1"/>
+                                  </a:solidFill>
+                                  <a:effectLst/>
+                                  <a:latin typeface="Cambria Math" panose="02040503050406030204" pitchFamily="18" charset="0"/>
+                                  <a:ea typeface="+mn-ea"/>
+                                  <a:cs typeface="+mn-cs"/>
+                                </a:rPr>
+                                <m:t>=</m:t>
+                              </m:r>
+                              <m:sSub>
+                                <m:sSubPr>
+                                  <m:ctrlPr>
+                                    <a:rPr lang="en-GB" sz="1800" b="1" i="1" kern="1200" smtClean="0">
+                                      <a:solidFill>
+                                        <a:schemeClr val="dk1"/>
+                                      </a:solidFill>
+                                      <a:effectLst/>
+                                      <a:latin typeface="Cambria Math" panose="02040503050406030204" pitchFamily="18" charset="0"/>
+                                      <a:ea typeface="+mn-ea"/>
+                                      <a:cs typeface="+mn-cs"/>
+                                    </a:rPr>
+                                  </m:ctrlPr>
+                                </m:sSubPr>
+                                <m:e>
+                                  <m:r>
+                                    <a:rPr lang="en-GB" sz="1800" b="1" i="1" kern="1200" smtClean="0">
+                                      <a:solidFill>
+                                        <a:schemeClr val="dk1"/>
+                                      </a:solidFill>
+                                      <a:effectLst/>
+                                      <a:latin typeface="Cambria Math" panose="02040503050406030204" pitchFamily="18" charset="0"/>
+                                      <a:ea typeface="Cambria Math" panose="02040503050406030204" pitchFamily="18" charset="0"/>
+                                      <a:cs typeface="+mn-cs"/>
+                                    </a:rPr>
+                                    <m:t>𝝁</m:t>
+                                  </m:r>
+                                </m:e>
+                                <m:sub>
+                                  <m:r>
+                                    <a:rPr lang="en-GB" sz="1800" b="1" i="1" kern="1200" smtClean="0">
+                                      <a:solidFill>
+                                        <a:schemeClr val="dk1"/>
+                                      </a:solidFill>
+                                      <a:effectLst/>
+                                      <a:latin typeface="Cambria Math" panose="02040503050406030204" pitchFamily="18" charset="0"/>
+                                      <a:ea typeface="+mn-ea"/>
+                                      <a:cs typeface="+mn-cs"/>
+                                    </a:rPr>
+                                    <m:t>𝒄𝒐𝒗</m:t>
+                                  </m:r>
+                                </m:sub>
+                              </m:sSub>
+                            </m:oMath>
+                          </a14:m>
+                          <a:r>
+                            <a:rPr lang="en-GB" sz="1800" b="1" i="0" kern="1200" dirty="0">
+                              <a:solidFill>
+                                <a:schemeClr val="dk1"/>
+                              </a:solidFill>
+                              <a:effectLst/>
+                              <a:latin typeface="+mn-lt"/>
+                              <a:ea typeface="+mn-ea"/>
+                              <a:cs typeface="+mn-cs"/>
+                            </a:rPr>
+                            <a:t>-</a:t>
+                          </a:r>
+                          <a14:m>
+                            <m:oMath xmlns:m="http://schemas.openxmlformats.org/officeDocument/2006/math">
+                              <m:r>
+                                <a:rPr lang="en-GB" sz="1800" b="1" i="0" kern="1200" smtClean="0">
+                                  <a:solidFill>
+                                    <a:schemeClr val="dk1"/>
+                                  </a:solidFill>
+                                  <a:effectLst/>
+                                  <a:latin typeface="Cambria Math" panose="02040503050406030204" pitchFamily="18" charset="0"/>
+                                  <a:ea typeface="+mn-ea"/>
+                                  <a:cs typeface="+mn-cs"/>
+                                </a:rPr>
+                                <m:t> </m:t>
+                              </m:r>
+                              <m:sSub>
+                                <m:sSubPr>
+                                  <m:ctrlPr>
+                                    <a:rPr lang="en-GB" sz="1800" b="1" i="1" kern="1200" smtClean="0">
+                                      <a:solidFill>
+                                        <a:schemeClr val="dk1"/>
+                                      </a:solidFill>
+                                      <a:effectLst/>
+                                      <a:latin typeface="Cambria Math" panose="02040503050406030204" pitchFamily="18" charset="0"/>
+                                      <a:ea typeface="+mn-ea"/>
+                                      <a:cs typeface="+mn-cs"/>
+                                    </a:rPr>
+                                  </m:ctrlPr>
+                                </m:sSubPr>
+                                <m:e>
+                                  <m:r>
+                                    <a:rPr lang="en-GB" sz="1800" b="1" i="1" kern="1200" smtClean="0">
+                                      <a:solidFill>
+                                        <a:schemeClr val="dk1"/>
+                                      </a:solidFill>
+                                      <a:effectLst/>
+                                      <a:latin typeface="Cambria Math" panose="02040503050406030204" pitchFamily="18" charset="0"/>
+                                      <a:ea typeface="Cambria Math" panose="02040503050406030204" pitchFamily="18" charset="0"/>
+                                      <a:cs typeface="+mn-cs"/>
+                                    </a:rPr>
+                                    <m:t>𝝁</m:t>
+                                  </m:r>
+                                </m:e>
+                                <m:sub>
+                                  <m:r>
+                                    <a:rPr lang="en-GB" sz="1800" b="1" i="1" kern="1200" smtClean="0">
+                                      <a:solidFill>
+                                        <a:schemeClr val="dk1"/>
+                                      </a:solidFill>
+                                      <a:effectLst/>
+                                      <a:latin typeface="Cambria Math" panose="02040503050406030204" pitchFamily="18" charset="0"/>
+                                      <a:ea typeface="Cambria Math" panose="02040503050406030204" pitchFamily="18" charset="0"/>
+                                      <a:cs typeface="+mn-cs"/>
+                                    </a:rPr>
+                                    <m:t>𝒑</m:t>
+                                  </m:r>
+                                  <m:r>
+                                    <a:rPr lang="en-GB" sz="1800" b="1" i="1" kern="1200" smtClean="0">
+                                      <a:solidFill>
+                                        <a:schemeClr val="dk1"/>
+                                      </a:solidFill>
+                                      <a:effectLst/>
+                                      <a:latin typeface="Cambria Math" panose="02040503050406030204" pitchFamily="18" charset="0"/>
+                                      <a:ea typeface="+mn-ea"/>
+                                      <a:cs typeface="+mn-cs"/>
+                                    </a:rPr>
+                                    <m:t>𝒓𝒆𝒄𝒐𝒗</m:t>
+                                  </m:r>
+                                </m:sub>
+                              </m:sSub>
+                            </m:oMath>
+                          </a14:m>
+                          <a:r>
+                            <a:rPr lang="en-GB" sz="1800" b="1" i="0" kern="1200" dirty="0">
+                              <a:solidFill>
+                                <a:schemeClr val="dk1"/>
+                              </a:solidFill>
+                              <a:effectLst/>
+                              <a:latin typeface="+mn-lt"/>
+                              <a:ea typeface="+mn-ea"/>
+                              <a:cs typeface="+mn-cs"/>
+                            </a:rPr>
+                            <a:t> &gt; 0</a:t>
+                          </a:r>
+                        </a:p>
+                        <a:p>
+                          <a:pPr marL="0" marR="0" lvl="0" indent="0" algn="l" defTabSz="914400" rtl="0" eaLnBrk="1" fontAlgn="auto" latinLnBrk="0" hangingPunct="1">
+                            <a:lnSpc>
+                              <a:spcPct val="100000"/>
+                            </a:lnSpc>
+                            <a:spcBef>
+                              <a:spcPts val="0"/>
+                            </a:spcBef>
+                            <a:spcAft>
+                              <a:spcPts val="0"/>
+                            </a:spcAft>
+                            <a:buClrTx/>
+                            <a:buSzTx/>
+                            <a:buFontTx/>
+                            <a:buNone/>
+                            <a:tabLst/>
+                            <a:defRPr/>
+                          </a:pPr>
+                          <a:endParaRPr lang="en-GB" sz="1800" b="1" i="0" kern="1200" dirty="0">
+                            <a:solidFill>
+                              <a:schemeClr val="dk1"/>
+                            </a:solidFill>
+                            <a:effectLst/>
+                            <a:latin typeface="+mn-lt"/>
+                            <a:ea typeface="+mn-ea"/>
+                            <a:cs typeface="+mn-cs"/>
+                          </a:endParaRPr>
+                        </a:p>
+                        <a:p>
+                          <a:pPr marL="0" marR="0" lvl="0" indent="0" algn="l" defTabSz="914400" rtl="0" eaLnBrk="1" fontAlgn="auto" latinLnBrk="0" hangingPunct="1">
+                            <a:lnSpc>
+                              <a:spcPct val="100000"/>
+                            </a:lnSpc>
+                            <a:spcBef>
+                              <a:spcPts val="0"/>
+                            </a:spcBef>
+                            <a:spcAft>
+                              <a:spcPts val="0"/>
+                            </a:spcAft>
+                            <a:buClrTx/>
+                            <a:buSzTx/>
+                            <a:buFontTx/>
+                            <a:buNone/>
+                            <a:tabLst/>
+                            <a:defRPr/>
+                          </a:pPr>
+                          <a:r>
+                            <a:rPr lang="en-GB" sz="1800" b="1" i="0" kern="1200" dirty="0">
+                              <a:solidFill>
+                                <a:schemeClr val="dk1"/>
+                              </a:solidFill>
+                              <a:effectLst/>
+                              <a:latin typeface="+mn-lt"/>
+                              <a:ea typeface="+mn-ea"/>
+                              <a:cs typeface="+mn-cs"/>
+                            </a:rPr>
+                            <a:t>Test Type: 2 sample dependent</a:t>
+                          </a:r>
+                        </a:p>
+                      </a:txBody>
+                      <a:tcPr/>
+                    </a:tc>
+                    <a:tc>
+                      <a:txBody>
+                        <a:bodyPr/>
+                        <a:lstStyle/>
+                        <a:p>
+                          <a:r>
+                            <a:rPr lang="el-GR" sz="1800" b="1" i="0" kern="1200" dirty="0">
+                              <a:solidFill>
+                                <a:schemeClr val="dk1"/>
+                              </a:solidFill>
+                              <a:effectLst/>
+                              <a:latin typeface="+mn-lt"/>
+                              <a:ea typeface="+mn-ea"/>
+                              <a:cs typeface="+mn-cs"/>
+                            </a:rPr>
+                            <a:t>α</a:t>
+                          </a:r>
+                          <a:r>
+                            <a:rPr lang="en-GB" sz="1800" b="1" i="0" kern="1200" dirty="0">
+                              <a:solidFill>
+                                <a:schemeClr val="dk1"/>
+                              </a:solidFill>
+                              <a:effectLst/>
+                              <a:latin typeface="+mn-lt"/>
+                              <a:ea typeface="+mn-ea"/>
+                              <a:cs typeface="+mn-cs"/>
+                            </a:rPr>
+                            <a:t> = 0.05</a:t>
+                          </a:r>
+                          <a:endParaRPr lang="en-GB" sz="1800" b="1" i="1" kern="1200" dirty="0">
+                            <a:solidFill>
+                              <a:schemeClr val="dk1"/>
+                            </a:solidFill>
+                            <a:effectLst/>
+                            <a:latin typeface="Cambria Math" panose="02040503050406030204" pitchFamily="18" charset="0"/>
+                            <a:ea typeface="+mn-ea"/>
+                            <a:cs typeface="+mn-cs"/>
+                          </a:endParaRPr>
+                        </a:p>
+                        <a:p>
+                          <a14:m>
+                            <m:oMath xmlns:m="http://schemas.openxmlformats.org/officeDocument/2006/math">
+                              <m:sSub>
+                                <m:sSubPr>
+                                  <m:ctrlPr>
+                                    <a:rPr lang="en-GB" sz="1800" b="1" i="1" kern="1200" smtClean="0">
+                                      <a:solidFill>
+                                        <a:schemeClr val="dk1"/>
+                                      </a:solidFill>
+                                      <a:effectLst/>
+                                      <a:latin typeface="Cambria Math" panose="02040503050406030204" pitchFamily="18" charset="0"/>
+                                      <a:ea typeface="+mn-ea"/>
+                                      <a:cs typeface="+mn-cs"/>
+                                    </a:rPr>
+                                  </m:ctrlPr>
+                                </m:sSubPr>
+                                <m:e>
+                                  <m:r>
+                                    <a:rPr lang="en-GB" sz="1800" b="1" i="1" kern="1200" smtClean="0">
+                                      <a:solidFill>
+                                        <a:schemeClr val="dk1"/>
+                                      </a:solidFill>
+                                      <a:effectLst/>
+                                      <a:latin typeface="Cambria Math" panose="02040503050406030204" pitchFamily="18" charset="0"/>
+                                      <a:ea typeface="+mn-ea"/>
+                                      <a:cs typeface="+mn-cs"/>
+                                    </a:rPr>
+                                    <m:t>𝑯</m:t>
+                                  </m:r>
+                                </m:e>
+                                <m:sub>
+                                  <m:r>
+                                    <a:rPr lang="en-GB" sz="1800" b="1" i="1" kern="1200" smtClean="0">
+                                      <a:solidFill>
+                                        <a:schemeClr val="dk1"/>
+                                      </a:solidFill>
+                                      <a:effectLst/>
+                                      <a:latin typeface="Cambria Math" panose="02040503050406030204" pitchFamily="18" charset="0"/>
+                                      <a:ea typeface="+mn-ea"/>
+                                      <a:cs typeface="+mn-cs"/>
+                                    </a:rPr>
+                                    <m:t>𝟎</m:t>
+                                  </m:r>
+                                </m:sub>
+                              </m:sSub>
+                              <m:r>
+                                <a:rPr lang="en-GB" sz="1800" b="1" i="1" kern="1200" smtClean="0">
+                                  <a:solidFill>
+                                    <a:schemeClr val="dk1"/>
+                                  </a:solidFill>
+                                  <a:effectLst/>
+                                  <a:latin typeface="Cambria Math" panose="02040503050406030204" pitchFamily="18" charset="0"/>
+                                  <a:ea typeface="+mn-ea"/>
+                                  <a:cs typeface="+mn-cs"/>
+                                </a:rPr>
+                                <m:t>=</m:t>
+                              </m:r>
+                              <m:sSub>
+                                <m:sSubPr>
+                                  <m:ctrlPr>
+                                    <a:rPr lang="en-GB" sz="1800" b="1" i="1" kern="1200" smtClean="0">
+                                      <a:solidFill>
+                                        <a:schemeClr val="dk1"/>
+                                      </a:solidFill>
+                                      <a:effectLst/>
+                                      <a:latin typeface="Cambria Math" panose="02040503050406030204" pitchFamily="18" charset="0"/>
+                                      <a:ea typeface="+mn-ea"/>
+                                      <a:cs typeface="+mn-cs"/>
+                                    </a:rPr>
+                                  </m:ctrlPr>
+                                </m:sSubPr>
+                                <m:e>
+                                  <m:r>
+                                    <a:rPr lang="en-GB" sz="1800" b="1" i="1" kern="1200" smtClean="0">
+                                      <a:solidFill>
+                                        <a:schemeClr val="dk1"/>
+                                      </a:solidFill>
+                                      <a:effectLst/>
+                                      <a:latin typeface="Cambria Math" panose="02040503050406030204" pitchFamily="18" charset="0"/>
+                                      <a:ea typeface="Cambria Math" panose="02040503050406030204" pitchFamily="18" charset="0"/>
+                                      <a:cs typeface="+mn-cs"/>
+                                    </a:rPr>
+                                    <m:t>𝝁</m:t>
+                                  </m:r>
+                                </m:e>
+                                <m:sub>
+                                  <m:r>
+                                    <a:rPr lang="en-GB" sz="1800" b="1" i="1" kern="1200" smtClean="0">
+                                      <a:solidFill>
+                                        <a:schemeClr val="dk1"/>
+                                      </a:solidFill>
+                                      <a:effectLst/>
+                                      <a:latin typeface="Cambria Math" panose="02040503050406030204" pitchFamily="18" charset="0"/>
+                                      <a:ea typeface="Cambria Math" panose="02040503050406030204" pitchFamily="18" charset="0"/>
+                                      <a:cs typeface="+mn-cs"/>
+                                    </a:rPr>
+                                    <m:t>𝒘𝒊𝒏𝒕𝒆𝒓</m:t>
+                                  </m:r>
+                                </m:sub>
+                              </m:sSub>
+                            </m:oMath>
+                          </a14:m>
+                          <a:r>
+                            <a:rPr lang="en-GB" sz="1800" b="1" i="0" kern="1200" dirty="0">
+                              <a:solidFill>
+                                <a:schemeClr val="dk1"/>
+                              </a:solidFill>
+                              <a:effectLst/>
+                              <a:latin typeface="+mn-lt"/>
+                              <a:ea typeface="+mn-ea"/>
+                              <a:cs typeface="+mn-cs"/>
+                            </a:rPr>
+                            <a:t>-</a:t>
+                          </a:r>
+                          <a14:m>
+                            <m:oMath xmlns:m="http://schemas.openxmlformats.org/officeDocument/2006/math">
+                              <m:r>
+                                <a:rPr lang="en-GB" sz="1800" b="1" i="0" kern="1200" smtClean="0">
+                                  <a:solidFill>
+                                    <a:schemeClr val="dk1"/>
+                                  </a:solidFill>
+                                  <a:effectLst/>
+                                  <a:latin typeface="Cambria Math" panose="02040503050406030204" pitchFamily="18" charset="0"/>
+                                  <a:ea typeface="+mn-ea"/>
+                                  <a:cs typeface="+mn-cs"/>
+                                </a:rPr>
+                                <m:t> </m:t>
+                              </m:r>
+                              <m:sSub>
+                                <m:sSubPr>
+                                  <m:ctrlPr>
+                                    <a:rPr lang="en-GB" sz="1800" b="1" i="1" kern="1200" smtClean="0">
+                                      <a:solidFill>
+                                        <a:schemeClr val="dk1"/>
+                                      </a:solidFill>
+                                      <a:effectLst/>
+                                      <a:latin typeface="Cambria Math" panose="02040503050406030204" pitchFamily="18" charset="0"/>
+                                      <a:ea typeface="+mn-ea"/>
+                                      <a:cs typeface="+mn-cs"/>
+                                    </a:rPr>
+                                  </m:ctrlPr>
+                                </m:sSubPr>
+                                <m:e>
+                                  <m:r>
+                                    <a:rPr lang="en-GB" sz="1800" b="1" i="1" kern="1200" smtClean="0">
+                                      <a:solidFill>
+                                        <a:schemeClr val="dk1"/>
+                                      </a:solidFill>
+                                      <a:effectLst/>
+                                      <a:latin typeface="Cambria Math" panose="02040503050406030204" pitchFamily="18" charset="0"/>
+                                      <a:ea typeface="Cambria Math" panose="02040503050406030204" pitchFamily="18" charset="0"/>
+                                      <a:cs typeface="+mn-cs"/>
+                                    </a:rPr>
+                                    <m:t>𝝁</m:t>
+                                  </m:r>
+                                </m:e>
+                                <m:sub>
+                                  <m:r>
+                                    <a:rPr lang="en-GB" sz="1800" b="1" i="1" kern="1200" smtClean="0">
+                                      <a:solidFill>
+                                        <a:schemeClr val="dk1"/>
+                                      </a:solidFill>
+                                      <a:effectLst/>
+                                      <a:latin typeface="Cambria Math" panose="02040503050406030204" pitchFamily="18" charset="0"/>
+                                      <a:ea typeface="Cambria Math" panose="02040503050406030204" pitchFamily="18" charset="0"/>
+                                      <a:cs typeface="+mn-cs"/>
+                                    </a:rPr>
+                                    <m:t>𝒔𝒆𝒂𝒔𝒐𝒏</m:t>
+                                  </m:r>
+                                </m:sub>
+                              </m:sSub>
+                            </m:oMath>
+                          </a14:m>
+                          <a:r>
+                            <a:rPr lang="en-GB" sz="1800" b="1" i="0" kern="1200" dirty="0">
+                              <a:solidFill>
+                                <a:schemeClr val="dk1"/>
+                              </a:solidFill>
+                              <a:effectLst/>
+                              <a:latin typeface="+mn-lt"/>
+                              <a:ea typeface="+mn-ea"/>
+                              <a:cs typeface="+mn-cs"/>
+                            </a:rPr>
+                            <a:t> = 0</a:t>
+                          </a:r>
+                        </a:p>
+                        <a:p>
+                          <a:pPr marL="0" marR="0" lvl="0" indent="0" algn="l" defTabSz="914400" rtl="0" eaLnBrk="1" fontAlgn="auto" latinLnBrk="0" hangingPunct="1">
+                            <a:lnSpc>
+                              <a:spcPct val="100000"/>
+                            </a:lnSpc>
+                            <a:spcBef>
+                              <a:spcPts val="0"/>
+                            </a:spcBef>
+                            <a:spcAft>
+                              <a:spcPts val="0"/>
+                            </a:spcAft>
+                            <a:buClrTx/>
+                            <a:buSzTx/>
+                            <a:buFontTx/>
+                            <a:buNone/>
+                            <a:tabLst/>
+                            <a:defRPr/>
+                          </a:pPr>
+                          <a14:m>
+                            <m:oMath xmlns:m="http://schemas.openxmlformats.org/officeDocument/2006/math">
+                              <m:sSub>
+                                <m:sSubPr>
+                                  <m:ctrlPr>
+                                    <a:rPr lang="en-GB" sz="1800" b="1" i="1" kern="1200" smtClean="0">
+                                      <a:solidFill>
+                                        <a:schemeClr val="dk1"/>
+                                      </a:solidFill>
+                                      <a:effectLst/>
+                                      <a:latin typeface="Cambria Math" panose="02040503050406030204" pitchFamily="18" charset="0"/>
+                                      <a:ea typeface="+mn-ea"/>
+                                      <a:cs typeface="+mn-cs"/>
+                                    </a:rPr>
+                                  </m:ctrlPr>
+                                </m:sSubPr>
+                                <m:e>
+                                  <m:r>
+                                    <a:rPr lang="en-GB" sz="1800" b="1" i="1" kern="1200" smtClean="0">
+                                      <a:solidFill>
+                                        <a:schemeClr val="dk1"/>
+                                      </a:solidFill>
+                                      <a:effectLst/>
+                                      <a:latin typeface="Cambria Math" panose="02040503050406030204" pitchFamily="18" charset="0"/>
+                                      <a:ea typeface="+mn-ea"/>
+                                      <a:cs typeface="+mn-cs"/>
+                                    </a:rPr>
+                                    <m:t>𝑯</m:t>
+                                  </m:r>
+                                </m:e>
+                                <m:sub>
+                                  <m:r>
+                                    <a:rPr lang="en-GB" sz="1800" b="1" i="1" kern="1200" smtClean="0">
+                                      <a:solidFill>
+                                        <a:schemeClr val="dk1"/>
+                                      </a:solidFill>
+                                      <a:effectLst/>
+                                      <a:latin typeface="Cambria Math" panose="02040503050406030204" pitchFamily="18" charset="0"/>
+                                      <a:ea typeface="Cambria Math" panose="02040503050406030204" pitchFamily="18" charset="0"/>
+                                      <a:cs typeface="+mn-cs"/>
+                                    </a:rPr>
+                                    <m:t>𝜶</m:t>
+                                  </m:r>
+                                </m:sub>
+                              </m:sSub>
+                              <m:r>
+                                <a:rPr lang="en-GB" sz="1800" b="1" i="1" kern="1200" smtClean="0">
+                                  <a:solidFill>
+                                    <a:schemeClr val="dk1"/>
+                                  </a:solidFill>
+                                  <a:effectLst/>
+                                  <a:latin typeface="Cambria Math" panose="02040503050406030204" pitchFamily="18" charset="0"/>
+                                  <a:ea typeface="+mn-ea"/>
+                                  <a:cs typeface="+mn-cs"/>
+                                </a:rPr>
+                                <m:t>=</m:t>
+                              </m:r>
+                              <m:sSub>
+                                <m:sSubPr>
+                                  <m:ctrlPr>
+                                    <a:rPr lang="en-GB" sz="1800" b="1" i="1" kern="1200" smtClean="0">
+                                      <a:solidFill>
+                                        <a:schemeClr val="dk1"/>
+                                      </a:solidFill>
+                                      <a:effectLst/>
+                                      <a:latin typeface="Cambria Math" panose="02040503050406030204" pitchFamily="18" charset="0"/>
+                                      <a:ea typeface="+mn-ea"/>
+                                      <a:cs typeface="+mn-cs"/>
+                                    </a:rPr>
+                                  </m:ctrlPr>
+                                </m:sSubPr>
+                                <m:e>
+                                  <m:r>
+                                    <a:rPr lang="en-GB" sz="1800" b="1" i="1" kern="1200" smtClean="0">
+                                      <a:solidFill>
+                                        <a:schemeClr val="dk1"/>
+                                      </a:solidFill>
+                                      <a:effectLst/>
+                                      <a:latin typeface="Cambria Math" panose="02040503050406030204" pitchFamily="18" charset="0"/>
+                                      <a:ea typeface="Cambria Math" panose="02040503050406030204" pitchFamily="18" charset="0"/>
+                                      <a:cs typeface="+mn-cs"/>
+                                    </a:rPr>
+                                    <m:t>𝝁</m:t>
+                                  </m:r>
+                                </m:e>
+                                <m:sub>
+                                  <m:r>
+                                    <a:rPr lang="en-GB" sz="1800" b="1" i="1" kern="1200" smtClean="0">
+                                      <a:solidFill>
+                                        <a:schemeClr val="dk1"/>
+                                      </a:solidFill>
+                                      <a:effectLst/>
+                                      <a:latin typeface="Cambria Math" panose="02040503050406030204" pitchFamily="18" charset="0"/>
+                                      <a:ea typeface="Cambria Math" panose="02040503050406030204" pitchFamily="18" charset="0"/>
+                                      <a:cs typeface="+mn-cs"/>
+                                    </a:rPr>
+                                    <m:t>𝒘𝒊𝒏𝒕𝒆𝒓</m:t>
+                                  </m:r>
+                                </m:sub>
+                              </m:sSub>
+                            </m:oMath>
+                          </a14:m>
+                          <a:r>
+                            <a:rPr lang="en-GB" sz="1800" b="1" i="0" kern="1200" dirty="0">
+                              <a:solidFill>
+                                <a:schemeClr val="dk1"/>
+                              </a:solidFill>
+                              <a:effectLst/>
+                              <a:latin typeface="+mn-lt"/>
+                              <a:ea typeface="+mn-ea"/>
+                              <a:cs typeface="+mn-cs"/>
+                            </a:rPr>
+                            <a:t>-</a:t>
+                          </a:r>
+                          <a14:m>
+                            <m:oMath xmlns:m="http://schemas.openxmlformats.org/officeDocument/2006/math">
+                              <m:r>
+                                <a:rPr lang="en-GB" sz="1800" b="1" i="0" kern="1200" smtClean="0">
+                                  <a:solidFill>
+                                    <a:schemeClr val="dk1"/>
+                                  </a:solidFill>
+                                  <a:effectLst/>
+                                  <a:latin typeface="Cambria Math" panose="02040503050406030204" pitchFamily="18" charset="0"/>
+                                  <a:ea typeface="+mn-ea"/>
+                                  <a:cs typeface="+mn-cs"/>
+                                </a:rPr>
+                                <m:t> </m:t>
+                              </m:r>
+                              <m:sSub>
+                                <m:sSubPr>
+                                  <m:ctrlPr>
+                                    <a:rPr lang="en-GB" sz="1800" b="1" i="1" kern="1200" smtClean="0">
+                                      <a:solidFill>
+                                        <a:schemeClr val="dk1"/>
+                                      </a:solidFill>
+                                      <a:effectLst/>
+                                      <a:latin typeface="Cambria Math" panose="02040503050406030204" pitchFamily="18" charset="0"/>
+                                      <a:ea typeface="+mn-ea"/>
+                                      <a:cs typeface="+mn-cs"/>
+                                    </a:rPr>
+                                  </m:ctrlPr>
+                                </m:sSubPr>
+                                <m:e>
+                                  <m:r>
+                                    <a:rPr lang="en-GB" sz="1800" b="1" i="1" kern="1200" smtClean="0">
+                                      <a:solidFill>
+                                        <a:schemeClr val="dk1"/>
+                                      </a:solidFill>
+                                      <a:effectLst/>
+                                      <a:latin typeface="Cambria Math" panose="02040503050406030204" pitchFamily="18" charset="0"/>
+                                      <a:ea typeface="Cambria Math" panose="02040503050406030204" pitchFamily="18" charset="0"/>
+                                      <a:cs typeface="+mn-cs"/>
+                                    </a:rPr>
+                                    <m:t>𝝁</m:t>
+                                  </m:r>
+                                </m:e>
+                                <m:sub>
+                                  <m:r>
+                                    <a:rPr lang="en-GB" sz="1800" b="1" i="1" kern="1200" smtClean="0">
+                                      <a:solidFill>
+                                        <a:schemeClr val="dk1"/>
+                                      </a:solidFill>
+                                      <a:effectLst/>
+                                      <a:latin typeface="Cambria Math" panose="02040503050406030204" pitchFamily="18" charset="0"/>
+                                      <a:ea typeface="Cambria Math" panose="02040503050406030204" pitchFamily="18" charset="0"/>
+                                      <a:cs typeface="+mn-cs"/>
+                                    </a:rPr>
+                                    <m:t>𝒔𝒆𝒂𝒔𝒐𝒏</m:t>
+                                  </m:r>
+                                </m:sub>
+                              </m:sSub>
+                            </m:oMath>
+                          </a14:m>
+                          <a:r>
+                            <a:rPr lang="en-GB" sz="1800" b="1" i="0" kern="1200" dirty="0">
+                              <a:solidFill>
+                                <a:schemeClr val="dk1"/>
+                              </a:solidFill>
+                              <a:effectLst/>
+                              <a:latin typeface="+mn-lt"/>
+                              <a:ea typeface="+mn-ea"/>
+                              <a:cs typeface="+mn-cs"/>
+                            </a:rPr>
+                            <a:t> &gt; 0</a:t>
+                          </a:r>
+                        </a:p>
+                        <a:p>
+                          <a:pPr marL="0" marR="0" lvl="0" indent="0" algn="l" defTabSz="914400" rtl="0" eaLnBrk="1" fontAlgn="auto" latinLnBrk="0" hangingPunct="1">
+                            <a:lnSpc>
+                              <a:spcPct val="100000"/>
+                            </a:lnSpc>
+                            <a:spcBef>
+                              <a:spcPts val="0"/>
+                            </a:spcBef>
+                            <a:spcAft>
+                              <a:spcPts val="0"/>
+                            </a:spcAft>
+                            <a:buClrTx/>
+                            <a:buSzTx/>
+                            <a:buFontTx/>
+                            <a:buNone/>
+                            <a:tabLst/>
+                            <a:defRPr/>
+                          </a:pPr>
+                          <a:endParaRPr lang="en-GB" sz="1800" b="1" i="0" kern="1200" dirty="0">
+                            <a:solidFill>
+                              <a:schemeClr val="dk1"/>
+                            </a:solidFill>
+                            <a:effectLst/>
+                            <a:latin typeface="+mn-lt"/>
+                            <a:ea typeface="+mn-ea"/>
+                            <a:cs typeface="+mn-cs"/>
+                          </a:endParaRPr>
+                        </a:p>
+                        <a:p>
+                          <a:pPr marL="0" marR="0" lvl="0" indent="0" algn="l" defTabSz="914400" rtl="0" eaLnBrk="1" fontAlgn="auto" latinLnBrk="0" hangingPunct="1">
+                            <a:lnSpc>
+                              <a:spcPct val="100000"/>
+                            </a:lnSpc>
+                            <a:spcBef>
+                              <a:spcPts val="0"/>
+                            </a:spcBef>
+                            <a:spcAft>
+                              <a:spcPts val="0"/>
+                            </a:spcAft>
+                            <a:buClrTx/>
+                            <a:buSzTx/>
+                            <a:buFontTx/>
+                            <a:buNone/>
+                            <a:tabLst/>
+                            <a:defRPr/>
+                          </a:pPr>
+                          <a:r>
+                            <a:rPr lang="en-GB" sz="1800" b="1" i="0" kern="1200" dirty="0">
+                              <a:solidFill>
+                                <a:schemeClr val="dk1"/>
+                              </a:solidFill>
+                              <a:effectLst/>
+                              <a:latin typeface="+mn-lt"/>
+                              <a:ea typeface="+mn-ea"/>
+                              <a:cs typeface="+mn-cs"/>
+                            </a:rPr>
+                            <a:t>Test Type: 2 sample independent</a:t>
+                          </a:r>
+                        </a:p>
+                      </a:txBody>
+                      <a:tcPr/>
+                    </a:tc>
+                    <a:extLst>
+                      <a:ext uri="{0D108BD9-81ED-4DB2-BD59-A6C34878D82A}">
+                        <a16:rowId xmlns:a16="http://schemas.microsoft.com/office/drawing/2014/main" val="982311256"/>
+                      </a:ext>
+                    </a:extLst>
+                  </a:tr>
+                  <a:tr h="843265">
+                    <a:tc>
+                      <a:txBody>
+                        <a:bodyPr/>
+                        <a:lstStyle/>
+                        <a:p>
+                          <a:r>
+                            <a:rPr lang="en-GB" b="1" dirty="0"/>
+                            <a:t>P-values</a:t>
+                          </a:r>
+                        </a:p>
+                      </a:txBody>
+                      <a:tcPr/>
+                    </a:tc>
+                    <a:tc>
+                      <a:txBody>
+                        <a:bodyPr/>
+                        <a:lstStyle/>
+                        <a:p>
+                          <a:r>
+                            <a:rPr lang="en-GB" b="1" dirty="0"/>
+                            <a:t>~1.00</a:t>
+                          </a:r>
+                        </a:p>
+                      </a:txBody>
+                      <a:tcPr/>
+                    </a:tc>
+                    <a:tc>
+                      <a:txBody>
+                        <a:bodyPr/>
+                        <a:lstStyle/>
+                        <a:p>
+                          <a:r>
+                            <a:rPr lang="en-GB" b="1" dirty="0"/>
+                            <a:t>Spring:     0.1682</a:t>
+                          </a:r>
+                        </a:p>
+                        <a:p>
+                          <a:r>
+                            <a:rPr lang="en-GB" b="1" dirty="0"/>
+                            <a:t>Summer:  0.5284</a:t>
+                          </a:r>
+                        </a:p>
+                        <a:p>
+                          <a:r>
+                            <a:rPr lang="en-GB" b="1" dirty="0"/>
+                            <a:t>Autumn:  0.7728</a:t>
+                          </a:r>
+                        </a:p>
+                      </a:txBody>
+                      <a:tcPr/>
+                    </a:tc>
+                    <a:extLst>
+                      <a:ext uri="{0D108BD9-81ED-4DB2-BD59-A6C34878D82A}">
+                        <a16:rowId xmlns:a16="http://schemas.microsoft.com/office/drawing/2014/main" val="2705622462"/>
+                      </a:ext>
+                    </a:extLst>
+                  </a:tr>
+                  <a:tr h="843265">
+                    <a:tc>
+                      <a:txBody>
+                        <a:bodyPr/>
+                        <a:lstStyle/>
+                        <a:p>
+                          <a:r>
+                            <a:rPr lang="en-GB" b="1" dirty="0"/>
+                            <a:t>Summary</a:t>
+                          </a:r>
+                        </a:p>
+                      </a:txBody>
+                      <a:tcPr/>
+                    </a:tc>
+                    <a:tc>
+                      <a:txBody>
+                        <a:bodyPr/>
+                        <a:lstStyle/>
+                        <a:p>
+                          <a:r>
+                            <a:rPr lang="en-GB" b="1" dirty="0"/>
+                            <a:t>Rejected </a:t>
+                          </a:r>
+                          <a14:m>
+                            <m:oMath xmlns:m="http://schemas.openxmlformats.org/officeDocument/2006/math">
+                              <m:sSub>
+                                <m:sSubPr>
+                                  <m:ctrlPr>
+                                    <a:rPr lang="en-GB" sz="1800" b="1" i="1" kern="1200" smtClean="0">
+                                      <a:solidFill>
+                                        <a:schemeClr val="dk1"/>
+                                      </a:solidFill>
+                                      <a:effectLst/>
+                                      <a:latin typeface="Cambria Math" panose="02040503050406030204" pitchFamily="18" charset="0"/>
+                                      <a:ea typeface="+mn-ea"/>
+                                      <a:cs typeface="+mn-cs"/>
+                                    </a:rPr>
+                                  </m:ctrlPr>
+                                </m:sSubPr>
+                                <m:e>
+                                  <m:r>
+                                    <a:rPr lang="en-GB" sz="1800" b="1" i="1" kern="1200" smtClean="0">
+                                      <a:solidFill>
+                                        <a:schemeClr val="dk1"/>
+                                      </a:solidFill>
+                                      <a:effectLst/>
+                                      <a:latin typeface="Cambria Math" panose="02040503050406030204" pitchFamily="18" charset="0"/>
+                                      <a:ea typeface="+mn-ea"/>
+                                      <a:cs typeface="+mn-cs"/>
+                                    </a:rPr>
+                                    <m:t>𝑯</m:t>
+                                  </m:r>
+                                </m:e>
+                                <m:sub>
+                                  <m:r>
+                                    <a:rPr lang="en-GB" sz="1800" b="1" i="1" kern="1200" smtClean="0">
+                                      <a:solidFill>
+                                        <a:schemeClr val="dk1"/>
+                                      </a:solidFill>
+                                      <a:effectLst/>
+                                      <a:latin typeface="Cambria Math" panose="02040503050406030204" pitchFamily="18" charset="0"/>
+                                      <a:ea typeface="+mn-ea"/>
+                                      <a:cs typeface="+mn-cs"/>
+                                    </a:rPr>
+                                    <m:t>𝟎</m:t>
+                                  </m:r>
+                                </m:sub>
+                              </m:sSub>
+                            </m:oMath>
+                          </a14:m>
+                          <a:r>
+                            <a:rPr lang="en-GB" sz="1800" b="1" kern="1200" dirty="0">
+                              <a:solidFill>
+                                <a:schemeClr val="dk1"/>
+                              </a:solidFill>
+                              <a:effectLst/>
+                              <a:ea typeface="+mn-ea"/>
+                              <a:cs typeface="+mn-cs"/>
+                            </a:rPr>
+                            <a:t> </a:t>
+                          </a:r>
+                        </a:p>
+                        <a:p>
+                          <a:endParaRPr lang="en-GB" sz="1800" b="1" kern="1200" dirty="0">
+                            <a:solidFill>
+                              <a:schemeClr val="dk1"/>
+                            </a:solidFill>
+                            <a:effectLst/>
+                            <a:ea typeface="+mn-ea"/>
+                            <a:cs typeface="+mn-cs"/>
+                          </a:endParaRPr>
+                        </a:p>
+                        <a:p>
+                          <a:endParaRPr lang="en-GB" b="1" dirty="0"/>
+                        </a:p>
+                      </a:txBody>
+                      <a:tcPr/>
+                    </a:tc>
+                    <a:tc>
+                      <a:txBody>
+                        <a:bodyPr/>
+                        <a:lstStyle/>
+                        <a:p>
+                          <a:r>
+                            <a:rPr lang="en-GB" b="1" dirty="0"/>
+                            <a:t>Failed to reject </a:t>
+                          </a:r>
+                          <a14:m>
+                            <m:oMath xmlns:m="http://schemas.openxmlformats.org/officeDocument/2006/math">
+                              <m:sSub>
+                                <m:sSubPr>
+                                  <m:ctrlPr>
+                                    <a:rPr lang="en-GB" sz="1800" b="1" i="1" kern="1200" smtClean="0">
+                                      <a:solidFill>
+                                        <a:schemeClr val="dk1"/>
+                                      </a:solidFill>
+                                      <a:effectLst/>
+                                      <a:latin typeface="Cambria Math" panose="02040503050406030204" pitchFamily="18" charset="0"/>
+                                      <a:ea typeface="+mn-ea"/>
+                                      <a:cs typeface="+mn-cs"/>
+                                    </a:rPr>
+                                  </m:ctrlPr>
+                                </m:sSubPr>
+                                <m:e>
+                                  <m:r>
+                                    <a:rPr lang="en-GB" sz="1800" b="1" i="1" kern="1200" smtClean="0">
+                                      <a:solidFill>
+                                        <a:schemeClr val="dk1"/>
+                                      </a:solidFill>
+                                      <a:effectLst/>
+                                      <a:latin typeface="Cambria Math" panose="02040503050406030204" pitchFamily="18" charset="0"/>
+                                      <a:ea typeface="+mn-ea"/>
+                                      <a:cs typeface="+mn-cs"/>
+                                    </a:rPr>
+                                    <m:t>𝑯</m:t>
+                                  </m:r>
+                                </m:e>
+                                <m:sub>
+                                  <m:r>
+                                    <a:rPr lang="en-GB" sz="1800" b="1" i="1" kern="1200" smtClean="0">
+                                      <a:solidFill>
+                                        <a:schemeClr val="dk1"/>
+                                      </a:solidFill>
+                                      <a:effectLst/>
+                                      <a:latin typeface="Cambria Math" panose="02040503050406030204" pitchFamily="18" charset="0"/>
+                                      <a:ea typeface="+mn-ea"/>
+                                      <a:cs typeface="+mn-cs"/>
+                                    </a:rPr>
+                                    <m:t>𝟎</m:t>
+                                  </m:r>
+                                </m:sub>
+                              </m:sSub>
+                            </m:oMath>
+                          </a14:m>
+                          <a:endParaRPr lang="en-GB" b="1" dirty="0"/>
+                        </a:p>
+                        <a:p>
+                          <a:endParaRPr lang="en-GB" b="1" dirty="0"/>
+                        </a:p>
+                      </a:txBody>
+                      <a:tcPr/>
+                    </a:tc>
+                    <a:extLst>
+                      <a:ext uri="{0D108BD9-81ED-4DB2-BD59-A6C34878D82A}">
+                        <a16:rowId xmlns:a16="http://schemas.microsoft.com/office/drawing/2014/main" val="4056555852"/>
+                      </a:ext>
+                    </a:extLst>
+                  </a:tr>
+                </a:tbl>
+              </a:graphicData>
+            </a:graphic>
+          </p:graphicFrame>
+        </mc:Choice>
+        <mc:Fallback>
+          <p:graphicFrame>
+            <p:nvGraphicFramePr>
+              <p:cNvPr id="4" name="Table 4">
+                <a:extLst>
+                  <a:ext uri="{FF2B5EF4-FFF2-40B4-BE49-F238E27FC236}">
+                    <a16:creationId xmlns:a16="http://schemas.microsoft.com/office/drawing/2014/main" id="{296AA3D8-87CF-4B3A-9AF6-5324AA89F96A}"/>
+                  </a:ext>
+                </a:extLst>
+              </p:cNvPr>
+              <p:cNvGraphicFramePr>
+                <a:graphicFrameLocks/>
+              </p:cNvGraphicFramePr>
+              <p:nvPr>
+                <p:extLst>
+                  <p:ext uri="{D42A27DB-BD31-4B8C-83A1-F6EECF244321}">
+                    <p14:modId xmlns:p14="http://schemas.microsoft.com/office/powerpoint/2010/main" val="2241294273"/>
+                  </p:ext>
+                </p:extLst>
+              </p:nvPr>
+            </p:nvGraphicFramePr>
+            <p:xfrm>
+              <a:off x="1148751" y="2079711"/>
+              <a:ext cx="9894498" cy="4015643"/>
+            </p:xfrm>
+            <a:graphic>
+              <a:graphicData uri="http://schemas.openxmlformats.org/drawingml/2006/table">
+                <a:tbl>
+                  <a:tblPr firstRow="1" bandRow="1">
+                    <a:tableStyleId>{5C22544A-7EE6-4342-B048-85BDC9FD1C3A}</a:tableStyleId>
+                  </a:tblPr>
+                  <a:tblGrid>
+                    <a:gridCol w="1753409">
+                      <a:extLst>
+                        <a:ext uri="{9D8B030D-6E8A-4147-A177-3AD203B41FA5}">
+                          <a16:colId xmlns:a16="http://schemas.microsoft.com/office/drawing/2014/main" val="2480767501"/>
+                        </a:ext>
+                      </a:extLst>
+                    </a:gridCol>
+                    <a:gridCol w="4042104">
+                      <a:extLst>
+                        <a:ext uri="{9D8B030D-6E8A-4147-A177-3AD203B41FA5}">
+                          <a16:colId xmlns:a16="http://schemas.microsoft.com/office/drawing/2014/main" val="2220793226"/>
+                        </a:ext>
+                      </a:extLst>
+                    </a:gridCol>
+                    <a:gridCol w="4098985">
+                      <a:extLst>
+                        <a:ext uri="{9D8B030D-6E8A-4147-A177-3AD203B41FA5}">
+                          <a16:colId xmlns:a16="http://schemas.microsoft.com/office/drawing/2014/main" val="3967160999"/>
+                        </a:ext>
+                      </a:extLst>
+                    </a:gridCol>
+                  </a:tblGrid>
+                  <a:tr h="674527">
+                    <a:tc>
+                      <a:txBody>
+                        <a:bodyPr/>
+                        <a:lstStyle/>
+                        <a:p>
+                          <a:r>
+                            <a:rPr lang="en-GB" dirty="0"/>
+                            <a:t>Index</a:t>
+                          </a:r>
+                        </a:p>
+                      </a:txBody>
+                      <a:tcPr>
+                        <a:solidFill>
+                          <a:srgbClr val="222323"/>
+                        </a:solidFill>
+                      </a:tcPr>
+                    </a:tc>
+                    <a:tc>
+                      <a:txBody>
+                        <a:bodyPr/>
+                        <a:lstStyle/>
+                        <a:p>
+                          <a:r>
+                            <a:rPr lang="en-GB" dirty="0"/>
+                            <a:t>Covid Impact on hospital Activity</a:t>
+                          </a:r>
+                        </a:p>
+                      </a:txBody>
+                      <a:tcPr>
+                        <a:solidFill>
+                          <a:srgbClr val="222323"/>
+                        </a:solidFill>
+                      </a:tcPr>
+                    </a:tc>
+                    <a:tc>
+                      <a:txBody>
+                        <a:bodyPr/>
+                        <a:lstStyle/>
+                        <a:p>
+                          <a:r>
+                            <a:rPr lang="en-GB" dirty="0"/>
+                            <a:t>Winter Impact on Hospital Activity</a:t>
+                          </a:r>
+                        </a:p>
+                      </a:txBody>
+                      <a:tcPr>
+                        <a:solidFill>
+                          <a:srgbClr val="222323"/>
+                        </a:solidFill>
+                      </a:tcPr>
+                    </a:tc>
+                    <a:extLst>
+                      <a:ext uri="{0D108BD9-81ED-4DB2-BD59-A6C34878D82A}">
+                        <a16:rowId xmlns:a16="http://schemas.microsoft.com/office/drawing/2014/main" val="3295140544"/>
+                      </a:ext>
+                    </a:extLst>
+                  </a:tr>
+                  <a:tr h="1512316">
+                    <a:tc>
+                      <a:txBody>
+                        <a:bodyPr/>
+                        <a:lstStyle/>
+                        <a:p>
+                          <a:pPr marL="0" marR="0" lvl="0" indent="0" algn="l" defTabSz="914400" rtl="0" eaLnBrk="1" fontAlgn="auto" latinLnBrk="0" hangingPunct="1">
+                            <a:lnSpc>
+                              <a:spcPct val="100000"/>
+                            </a:lnSpc>
+                            <a:spcBef>
+                              <a:spcPts val="0"/>
+                            </a:spcBef>
+                            <a:spcAft>
+                              <a:spcPts val="0"/>
+                            </a:spcAft>
+                            <a:buClrTx/>
+                            <a:buSzTx/>
+                            <a:buFontTx/>
+                            <a:buNone/>
+                            <a:tabLst/>
+                            <a:defRPr/>
+                          </a:pPr>
+                          <a:r>
+                            <a:rPr lang="en-GB" sz="1800" b="1" i="0" kern="1200" dirty="0">
+                              <a:solidFill>
+                                <a:schemeClr val="dk1"/>
+                              </a:solidFill>
+                              <a:effectLst/>
+                              <a:latin typeface="+mn-lt"/>
+                              <a:ea typeface="+mn-ea"/>
+                              <a:cs typeface="+mn-cs"/>
+                            </a:rPr>
+                            <a:t>Setup:</a:t>
+                          </a:r>
+                        </a:p>
+                      </a:txBody>
+                      <a:tcPr/>
+                    </a:tc>
+                    <a:tc>
+                      <a:txBody>
+                        <a:bodyPr/>
+                        <a:lstStyle/>
+                        <a:p>
+                          <a:endParaRPr lang="en-US"/>
+                        </a:p>
+                      </a:txBody>
+                      <a:tcPr>
+                        <a:blipFill>
+                          <a:blip r:embed="rId2"/>
+                          <a:stretch>
+                            <a:fillRect l="-43590" t="-46774" r="-102112" b="-121774"/>
+                          </a:stretch>
+                        </a:blipFill>
+                      </a:tcPr>
+                    </a:tc>
+                    <a:tc>
+                      <a:txBody>
+                        <a:bodyPr/>
+                        <a:lstStyle/>
+                        <a:p>
+                          <a:endParaRPr lang="en-US"/>
+                        </a:p>
+                      </a:txBody>
+                      <a:tcPr>
+                        <a:blipFill>
+                          <a:blip r:embed="rId2"/>
+                          <a:stretch>
+                            <a:fillRect l="-141456" t="-46774" r="-594" b="-121774"/>
+                          </a:stretch>
+                        </a:blipFill>
+                      </a:tcPr>
+                    </a:tc>
+                    <a:extLst>
+                      <a:ext uri="{0D108BD9-81ED-4DB2-BD59-A6C34878D82A}">
+                        <a16:rowId xmlns:a16="http://schemas.microsoft.com/office/drawing/2014/main" val="982311256"/>
+                      </a:ext>
+                    </a:extLst>
+                  </a:tr>
+                  <a:tr h="914400">
+                    <a:tc>
+                      <a:txBody>
+                        <a:bodyPr/>
+                        <a:lstStyle/>
+                        <a:p>
+                          <a:r>
+                            <a:rPr lang="en-GB" b="1" dirty="0"/>
+                            <a:t>P-values</a:t>
+                          </a:r>
+                        </a:p>
+                      </a:txBody>
+                      <a:tcPr/>
+                    </a:tc>
+                    <a:tc>
+                      <a:txBody>
+                        <a:bodyPr/>
+                        <a:lstStyle/>
+                        <a:p>
+                          <a:r>
+                            <a:rPr lang="en-GB" b="1" dirty="0"/>
+                            <a:t>~1.00</a:t>
+                          </a:r>
+                        </a:p>
+                      </a:txBody>
+                      <a:tcPr/>
+                    </a:tc>
+                    <a:tc>
+                      <a:txBody>
+                        <a:bodyPr/>
+                        <a:lstStyle/>
+                        <a:p>
+                          <a:r>
+                            <a:rPr lang="en-GB" b="1" dirty="0"/>
+                            <a:t>Spring:     0.1682</a:t>
+                          </a:r>
+                        </a:p>
+                        <a:p>
+                          <a:r>
+                            <a:rPr lang="en-GB" b="1" dirty="0"/>
+                            <a:t>Summer:  0.5284</a:t>
+                          </a:r>
+                        </a:p>
+                        <a:p>
+                          <a:r>
+                            <a:rPr lang="en-GB" b="1" dirty="0"/>
+                            <a:t>Autumn:  0.7728</a:t>
+                          </a:r>
+                        </a:p>
+                      </a:txBody>
+                      <a:tcPr/>
+                    </a:tc>
+                    <a:extLst>
+                      <a:ext uri="{0D108BD9-81ED-4DB2-BD59-A6C34878D82A}">
+                        <a16:rowId xmlns:a16="http://schemas.microsoft.com/office/drawing/2014/main" val="2705622462"/>
+                      </a:ext>
+                    </a:extLst>
+                  </a:tr>
+                  <a:tr h="914400">
+                    <a:tc>
+                      <a:txBody>
+                        <a:bodyPr/>
+                        <a:lstStyle/>
+                        <a:p>
+                          <a:r>
+                            <a:rPr lang="en-GB" b="1" dirty="0"/>
+                            <a:t>Summary</a:t>
+                          </a:r>
+                        </a:p>
+                      </a:txBody>
+                      <a:tcPr/>
+                    </a:tc>
+                    <a:tc>
+                      <a:txBody>
+                        <a:bodyPr/>
+                        <a:lstStyle/>
+                        <a:p>
+                          <a:endParaRPr lang="en-US"/>
+                        </a:p>
+                      </a:txBody>
+                      <a:tcPr>
+                        <a:blipFill>
+                          <a:blip r:embed="rId2"/>
+                          <a:stretch>
+                            <a:fillRect l="-43590" t="-342667" r="-102112" b="-1333"/>
+                          </a:stretch>
+                        </a:blipFill>
+                      </a:tcPr>
+                    </a:tc>
+                    <a:tc>
+                      <a:txBody>
+                        <a:bodyPr/>
+                        <a:lstStyle/>
+                        <a:p>
+                          <a:endParaRPr lang="en-US"/>
+                        </a:p>
+                      </a:txBody>
+                      <a:tcPr>
+                        <a:blipFill>
+                          <a:blip r:embed="rId2"/>
+                          <a:stretch>
+                            <a:fillRect l="-141456" t="-342667" r="-594" b="-1333"/>
+                          </a:stretch>
+                        </a:blipFill>
+                      </a:tcPr>
+                    </a:tc>
+                    <a:extLst>
+                      <a:ext uri="{0D108BD9-81ED-4DB2-BD59-A6C34878D82A}">
+                        <a16:rowId xmlns:a16="http://schemas.microsoft.com/office/drawing/2014/main" val="4056555852"/>
+                      </a:ext>
+                    </a:extLst>
+                  </a:tr>
+                </a:tbl>
+              </a:graphicData>
+            </a:graphic>
+          </p:graphicFrame>
+        </mc:Fallback>
+      </mc:AlternateContent>
+    </p:spTree>
+    <p:extLst>
+      <p:ext uri="{BB962C8B-B14F-4D97-AF65-F5344CB8AC3E}">
+        <p14:creationId xmlns:p14="http://schemas.microsoft.com/office/powerpoint/2010/main" val="2260300152"/>
+      </p:ext>
+    </p:extLst>
+  </p:cSld>
+  <p:clrMapOvr>
+    <a:masterClrMapping/>
+  </p:clrMapOvr>
+</p:sld>
+</file>
+
+<file path=ppt/slides/slide12.xml><?xml version="1.0" encoding="utf-8"?>
 <p:sld xmlns:a="http://schemas.openxmlformats.org/drawingml/2006/main" xmlns:r="http://schemas.openxmlformats.org/officeDocument/2006/relationships" xmlns:p="http://schemas.openxmlformats.org/presentationml/2006/main">
   <p:cSld>
     <p:spTree>

</xml_diff>

<commit_message>
wee update on presentation results slide
</commit_message>
<xml_diff>
--- a/Presentation/PHS Rshiny Team Klas.pptx
+++ b/Presentation/PHS Rshiny Team Klas.pptx
@@ -7440,6 +7440,90 @@
 </p:notes>
 </file>
 
+<file path=ppt/notesSlides/notesSlide8.xml><?xml version="1.0" encoding="utf-8"?>
+<p:notes xmlns:a="http://schemas.openxmlformats.org/drawingml/2006/main" xmlns:r="http://schemas.openxmlformats.org/officeDocument/2006/relationships" xmlns:p="http://schemas.openxmlformats.org/presentationml/2006/main">
+  <p:cSld>
+    <p:spTree>
+      <p:nvGrpSpPr>
+        <p:cNvPr id="1" name=""/>
+        <p:cNvGrpSpPr/>
+        <p:nvPr/>
+      </p:nvGrpSpPr>
+      <p:grpSpPr>
+        <a:xfrm>
+          <a:off x="0" y="0"/>
+          <a:ext cx="0" cy="0"/>
+          <a:chOff x="0" y="0"/>
+          <a:chExt cx="0" cy="0"/>
+        </a:xfrm>
+      </p:grpSpPr>
+      <p:sp>
+        <p:nvSpPr>
+          <p:cNvPr id="2" name="Slide Image Placeholder 1"/>
+          <p:cNvSpPr>
+            <a:spLocks noGrp="1" noRot="1" noChangeAspect="1"/>
+          </p:cNvSpPr>
+          <p:nvPr>
+            <p:ph type="sldImg"/>
+          </p:nvPr>
+        </p:nvSpPr>
+        <p:spPr/>
+      </p:sp>
+      <p:sp>
+        <p:nvSpPr>
+          <p:cNvPr id="3" name="Notes Placeholder 2"/>
+          <p:cNvSpPr>
+            <a:spLocks noGrp="1"/>
+          </p:cNvSpPr>
+          <p:nvPr>
+            <p:ph type="body" idx="1"/>
+          </p:nvPr>
+        </p:nvSpPr>
+        <p:spPr/>
+        <p:txBody>
+          <a:bodyPr/>
+          <a:lstStyle/>
+          <a:p>
+            <a:endParaRPr lang="en-GB" dirty="0"/>
+          </a:p>
+        </p:txBody>
+      </p:sp>
+      <p:sp>
+        <p:nvSpPr>
+          <p:cNvPr id="4" name="Slide Number Placeholder 3"/>
+          <p:cNvSpPr>
+            <a:spLocks noGrp="1"/>
+          </p:cNvSpPr>
+          <p:nvPr>
+            <p:ph type="sldNum" sz="quarter" idx="5"/>
+          </p:nvPr>
+        </p:nvSpPr>
+        <p:spPr/>
+        <p:txBody>
+          <a:bodyPr/>
+          <a:lstStyle/>
+          <a:p>
+            <a:fld id="{7AA399A9-3A42-E441-96E8-5E8E9FEDAD92}" type="slidenum">
+              <a:rPr lang="en-US" smtClean="0"/>
+              <a:t>11</a:t>
+            </a:fld>
+            <a:endParaRPr lang="en-US"/>
+          </a:p>
+        </p:txBody>
+      </p:sp>
+    </p:spTree>
+    <p:extLst>
+      <p:ext uri="{BB962C8B-B14F-4D97-AF65-F5344CB8AC3E}">
+        <p14:creationId xmlns:p14="http://schemas.microsoft.com/office/powerpoint/2010/main" val="497340568"/>
+      </p:ext>
+    </p:extLst>
+  </p:cSld>
+  <p:clrMapOvr>
+    <a:masterClrMapping/>
+  </p:clrMapOvr>
+</p:notes>
+</file>
+
 <file path=ppt/slideLayouts/slideLayout1.xml><?xml version="1.0" encoding="utf-8"?>
 <p:sldLayout xmlns:a="http://schemas.openxmlformats.org/drawingml/2006/main" xmlns:r="http://schemas.openxmlformats.org/officeDocument/2006/relationships" xmlns:p="http://schemas.openxmlformats.org/presentationml/2006/main" type="title" preserve="1">
   <p:cSld name="Title Slide">
@@ -14144,7 +14228,7 @@
               <p:nvPr>
                 <p:extLst>
                   <p:ext uri="{D42A27DB-BD31-4B8C-83A1-F6EECF244321}">
-                    <p14:modId xmlns:p14="http://schemas.microsoft.com/office/powerpoint/2010/main" val="2241294273"/>
+                    <p14:modId xmlns:p14="http://schemas.microsoft.com/office/powerpoint/2010/main" val="132383291"/>
                   </p:ext>
                 </p:extLst>
               </p:nvPr>
@@ -14157,7 +14241,7 @@
               <a:graphicData uri="http://schemas.openxmlformats.org/drawingml/2006/table">
                 <a:tbl>
                   <a:tblPr firstRow="1" bandRow="1">
-                    <a:tableStyleId>{5C22544A-7EE6-4342-B048-85BDC9FD1C3A}</a:tableStyleId>
+                    <a:tableStyleId>{00A15C55-8517-42AA-B614-E9B94910E393}</a:tableStyleId>
                   </a:tblPr>
                   <a:tblGrid>
                     <a:gridCol w="1753409">
@@ -14264,17 +14348,23 @@
                             <a:defRPr/>
                           </a:pPr>
                           <a:r>
-                            <a:rPr lang="en-GB" sz="1800" b="1" i="0" kern="1200" dirty="0">
+                            <a:rPr lang="en-GB" sz="1800" b="1" kern="1200" dirty="0">
                               <a:solidFill>
                                 <a:schemeClr val="dk1"/>
                               </a:solidFill>
                               <a:effectLst/>
-                              <a:latin typeface="+mn-lt"/>
-                              <a:ea typeface="+mn-ea"/>
-                              <a:cs typeface="+mn-cs"/>
                             </a:rPr>
                             <a:t>Setup:</a:t>
                           </a:r>
+                          <a:endParaRPr lang="en-GB" sz="1800" b="1" i="0" kern="1200" dirty="0">
+                            <a:solidFill>
+                              <a:schemeClr val="dk1"/>
+                            </a:solidFill>
+                            <a:effectLst/>
+                            <a:latin typeface="+mn-lt"/>
+                            <a:ea typeface="+mn-ea"/>
+                            <a:cs typeface="+mn-cs"/>
+                          </a:endParaRPr>
                         </a:p>
                       </a:txBody>
                       <a:tcPr/>
@@ -14285,38 +14375,23 @@
                         <a:lstStyle/>
                         <a:p>
                           <a:r>
-                            <a:rPr lang="el-GR" sz="1800" b="1" i="0" kern="1200" dirty="0">
+                            <a:rPr lang="el-GR" sz="1800" b="1" kern="1200" dirty="0">
                               <a:solidFill>
                                 <a:schemeClr val="dk1"/>
                               </a:solidFill>
                               <a:effectLst/>
-                              <a:latin typeface="+mn-lt"/>
-                              <a:ea typeface="+mn-ea"/>
-                              <a:cs typeface="+mn-cs"/>
                             </a:rPr>
                             <a:t>α</a:t>
                           </a:r>
                           <a:r>
-                            <a:rPr lang="en-GB" sz="1800" b="1" i="0" kern="1200" dirty="0">
+                            <a:rPr lang="en-GB" sz="1800" b="1" kern="1200" dirty="0">
                               <a:solidFill>
                                 <a:schemeClr val="dk1"/>
                               </a:solidFill>
                               <a:effectLst/>
-                              <a:latin typeface="+mn-lt"/>
-                              <a:ea typeface="+mn-ea"/>
-                              <a:cs typeface="+mn-cs"/>
                             </a:rPr>
                             <a:t> = 0.05</a:t>
                           </a:r>
-                          <a:endParaRPr lang="en-GB" sz="1800" b="1" i="1" kern="1200" dirty="0">
-                            <a:solidFill>
-                              <a:schemeClr val="dk1"/>
-                            </a:solidFill>
-                            <a:effectLst/>
-                            <a:latin typeface="Cambria Math" panose="02040503050406030204" pitchFamily="18" charset="0"/>
-                            <a:ea typeface="+mn-ea"/>
-                            <a:cs typeface="+mn-cs"/>
-                          </a:endParaRPr>
                         </a:p>
                         <a:p>
                           <a14:m>
@@ -14324,96 +14399,75 @@
                               <m:sSub>
                                 <m:sSubPr>
                                   <m:ctrlPr>
-                                    <a:rPr lang="en-GB" sz="1800" b="1" i="1" kern="1200" smtClean="0">
+                                    <a:rPr lang="en-GB" sz="1800" b="1" kern="1200" smtClean="0">
                                       <a:solidFill>
                                         <a:schemeClr val="dk1"/>
                                       </a:solidFill>
                                       <a:effectLst/>
-                                      <a:latin typeface="Cambria Math" panose="02040503050406030204" pitchFamily="18" charset="0"/>
-                                      <a:ea typeface="+mn-ea"/>
-                                      <a:cs typeface="+mn-cs"/>
                                     </a:rPr>
                                   </m:ctrlPr>
                                 </m:sSubPr>
                                 <m:e>
                                   <m:r>
-                                    <a:rPr lang="en-GB" sz="1800" b="1" i="1" kern="1200" smtClean="0">
+                                    <a:rPr lang="en-GB" sz="1800" b="1" kern="1200" smtClean="0">
                                       <a:solidFill>
                                         <a:schemeClr val="dk1"/>
                                       </a:solidFill>
                                       <a:effectLst/>
-                                      <a:latin typeface="Cambria Math" panose="02040503050406030204" pitchFamily="18" charset="0"/>
-                                      <a:ea typeface="+mn-ea"/>
-                                      <a:cs typeface="+mn-cs"/>
                                     </a:rPr>
                                     <m:t>𝑯</m:t>
                                   </m:r>
                                 </m:e>
                                 <m:sub>
                                   <m:r>
-                                    <a:rPr lang="en-GB" sz="1800" b="1" i="1" kern="1200" smtClean="0">
+                                    <a:rPr lang="en-GB" sz="1800" b="1" kern="1200" smtClean="0">
                                       <a:solidFill>
                                         <a:schemeClr val="dk1"/>
                                       </a:solidFill>
                                       <a:effectLst/>
-                                      <a:latin typeface="Cambria Math" panose="02040503050406030204" pitchFamily="18" charset="0"/>
-                                      <a:ea typeface="+mn-ea"/>
-                                      <a:cs typeface="+mn-cs"/>
                                     </a:rPr>
                                     <m:t>𝟎</m:t>
                                   </m:r>
                                 </m:sub>
                               </m:sSub>
                               <m:r>
-                                <a:rPr lang="en-GB" sz="1800" b="1" i="1" kern="1200" smtClean="0">
+                                <a:rPr lang="en-GB" sz="1800" b="1" kern="1200" smtClean="0">
                                   <a:solidFill>
                                     <a:schemeClr val="dk1"/>
                                   </a:solidFill>
                                   <a:effectLst/>
-                                  <a:latin typeface="Cambria Math" panose="02040503050406030204" pitchFamily="18" charset="0"/>
-                                  <a:ea typeface="+mn-ea"/>
-                                  <a:cs typeface="+mn-cs"/>
                                 </a:rPr>
                                 <m:t>=</m:t>
                               </m:r>
                               <m:sSub>
                                 <m:sSubPr>
                                   <m:ctrlPr>
-                                    <a:rPr lang="en-GB" sz="1800" b="1" i="1" kern="1200" smtClean="0">
+                                    <a:rPr lang="en-GB" sz="1800" b="1" kern="1200" smtClean="0">
                                       <a:solidFill>
                                         <a:schemeClr val="dk1"/>
                                       </a:solidFill>
                                       <a:effectLst/>
-                                      <a:latin typeface="Cambria Math" panose="02040503050406030204" pitchFamily="18" charset="0"/>
-                                      <a:ea typeface="+mn-ea"/>
-                                      <a:cs typeface="+mn-cs"/>
                                     </a:rPr>
                                   </m:ctrlPr>
                                 </m:sSubPr>
                                 <m:e>
                                   <m:r>
-                                    <a:rPr lang="en-GB" sz="1800" b="1" i="1" kern="1200" smtClean="0">
+                                    <a:rPr lang="en-GB" sz="1800" b="1" kern="1200" smtClean="0">
                                       <a:solidFill>
                                         <a:schemeClr val="dk1"/>
                                       </a:solidFill>
                                       <a:effectLst/>
-                                      <a:latin typeface="Cambria Math" panose="02040503050406030204" pitchFamily="18" charset="0"/>
-                                      <a:ea typeface="Cambria Math" panose="02040503050406030204" pitchFamily="18" charset="0"/>
-                                      <a:cs typeface="+mn-cs"/>
                                     </a:rPr>
                                     <m:t>𝝁</m:t>
                                   </m:r>
                                 </m:e>
                                 <m:sub>
                                   <m:r>
-                                    <a:rPr lang="en-GB" sz="1800" b="1" i="1" kern="1200" smtClean="0">
+                                    <a:rPr lang="en-GB" sz="1800" b="1" kern="1200" smtClean="0">
                                       <a:solidFill>
                                         <a:schemeClr val="dk1"/>
                                       </a:solidFill>
                                       <a:effectLst/>
-                                      <a:latin typeface="Cambria Math" panose="02040503050406030204" pitchFamily="18" charset="0"/>
-                                      <a:ea typeface="+mn-ea"/>
-                                      <a:cs typeface="+mn-cs"/>
                                     </a:rPr>
                                     <m:t>𝒄𝒐𝒗</m:t>
                                   </m:r>
@@ -14422,69 +14476,54 @@
                             </m:oMath>
                           </a14:m>
                           <a:r>
-                            <a:rPr lang="en-GB" sz="1800" b="1" i="0" kern="1200" dirty="0">
+                            <a:rPr lang="en-GB" sz="1800" b="1" kern="1200" dirty="0">
                               <a:solidFill>
                                 <a:schemeClr val="dk1"/>
                               </a:solidFill>
                               <a:effectLst/>
-                              <a:latin typeface="+mn-lt"/>
-                              <a:ea typeface="+mn-ea"/>
-                              <a:cs typeface="+mn-cs"/>
                             </a:rPr>
                             <a:t>-</a:t>
                           </a:r>
                           <a14:m>
                             <m:oMath xmlns:m="http://schemas.openxmlformats.org/officeDocument/2006/math">
                               <m:r>
-                                <a:rPr lang="en-GB" sz="1800" b="1" i="0" kern="1200" smtClean="0">
+                                <a:rPr lang="en-GB" sz="1800" b="1" kern="1200" smtClean="0">
                                   <a:solidFill>
                                     <a:schemeClr val="dk1"/>
                                   </a:solidFill>
                                   <a:effectLst/>
-                                  <a:latin typeface="Cambria Math" panose="02040503050406030204" pitchFamily="18" charset="0"/>
-                                  <a:ea typeface="+mn-ea"/>
-                                  <a:cs typeface="+mn-cs"/>
                                 </a:rPr>
                                 <m:t> </m:t>
                               </m:r>
                               <m:sSub>
                                 <m:sSubPr>
                                   <m:ctrlPr>
-                                    <a:rPr lang="en-GB" sz="1800" b="1" i="1" kern="1200" smtClean="0">
+                                    <a:rPr lang="en-GB" sz="1800" b="1" kern="1200" smtClean="0">
                                       <a:solidFill>
                                         <a:schemeClr val="dk1"/>
                                       </a:solidFill>
                                       <a:effectLst/>
-                                      <a:latin typeface="Cambria Math" panose="02040503050406030204" pitchFamily="18" charset="0"/>
-                                      <a:ea typeface="+mn-ea"/>
-                                      <a:cs typeface="+mn-cs"/>
                                     </a:rPr>
                                   </m:ctrlPr>
                                 </m:sSubPr>
                                 <m:e>
                                   <m:r>
-                                    <a:rPr lang="en-GB" sz="1800" b="1" i="1" kern="1200" smtClean="0">
+                                    <a:rPr lang="en-GB" sz="1800" b="1" kern="1200" smtClean="0">
                                       <a:solidFill>
                                         <a:schemeClr val="dk1"/>
                                       </a:solidFill>
                                       <a:effectLst/>
-                                      <a:latin typeface="Cambria Math" panose="02040503050406030204" pitchFamily="18" charset="0"/>
-                                      <a:ea typeface="Cambria Math" panose="02040503050406030204" pitchFamily="18" charset="0"/>
-                                      <a:cs typeface="+mn-cs"/>
                                     </a:rPr>
                                     <m:t>𝝁</m:t>
                                   </m:r>
                                 </m:e>
                                 <m:sub>
                                   <m:r>
-                                    <a:rPr lang="en-GB" sz="1800" b="1" i="1" kern="1200" smtClean="0">
+                                    <a:rPr lang="en-GB" sz="1800" b="1" kern="1200" smtClean="0">
                                       <a:solidFill>
                                         <a:schemeClr val="dk1"/>
                                       </a:solidFill>
                                       <a:effectLst/>
-                                      <a:latin typeface="Cambria Math" panose="02040503050406030204" pitchFamily="18" charset="0"/>
-                                      <a:ea typeface="+mn-ea"/>
-                                      <a:cs typeface="+mn-cs"/>
                                     </a:rPr>
                                     <m:t>𝒑𝒓𝒆𝒄𝒐𝒗</m:t>
                                   </m:r>
@@ -14493,14 +14532,11 @@
                             </m:oMath>
                           </a14:m>
                           <a:r>
-                            <a:rPr lang="en-GB" sz="1800" b="1" i="0" kern="1200" dirty="0">
+                            <a:rPr lang="en-GB" sz="1800" b="1" kern="1200" dirty="0">
                               <a:solidFill>
                                 <a:schemeClr val="dk1"/>
                               </a:solidFill>
                               <a:effectLst/>
-                              <a:latin typeface="+mn-lt"/>
-                              <a:ea typeface="+mn-ea"/>
-                              <a:cs typeface="+mn-cs"/>
                             </a:rPr>
                             <a:t> = 0</a:t>
                           </a:r>
@@ -14528,96 +14564,75 @@
                               <m:sSub>
                                 <m:sSubPr>
                                   <m:ctrlPr>
-                                    <a:rPr lang="en-GB" sz="1800" b="1" i="1" kern="1200" smtClean="0">
+                                    <a:rPr lang="en-GB" sz="1800" b="1" kern="1200" smtClean="0">
                                       <a:solidFill>
                                         <a:schemeClr val="dk1"/>
                                       </a:solidFill>
                                       <a:effectLst/>
-                                      <a:latin typeface="Cambria Math" panose="02040503050406030204" pitchFamily="18" charset="0"/>
-                                      <a:ea typeface="+mn-ea"/>
-                                      <a:cs typeface="+mn-cs"/>
                                     </a:rPr>
                                   </m:ctrlPr>
                                 </m:sSubPr>
                                 <m:e>
                                   <m:r>
-                                    <a:rPr lang="en-GB" sz="1800" b="1" i="1" kern="1200" smtClean="0">
+                                    <a:rPr lang="en-GB" sz="1800" b="1" kern="1200" smtClean="0">
                                       <a:solidFill>
                                         <a:schemeClr val="dk1"/>
                                       </a:solidFill>
                                       <a:effectLst/>
-                                      <a:latin typeface="Cambria Math" panose="02040503050406030204" pitchFamily="18" charset="0"/>
-                                      <a:ea typeface="+mn-ea"/>
-                                      <a:cs typeface="+mn-cs"/>
                                     </a:rPr>
                                     <m:t>𝑯</m:t>
                                   </m:r>
                                 </m:e>
                                 <m:sub>
                                   <m:r>
-                                    <a:rPr lang="en-GB" sz="1800" b="1" i="1" kern="1200" smtClean="0">
+                                    <a:rPr lang="en-GB" sz="1800" b="1" kern="1200" smtClean="0">
                                       <a:solidFill>
                                         <a:schemeClr val="dk1"/>
                                       </a:solidFill>
                                       <a:effectLst/>
-                                      <a:latin typeface="Cambria Math" panose="02040503050406030204" pitchFamily="18" charset="0"/>
-                                      <a:ea typeface="Cambria Math" panose="02040503050406030204" pitchFamily="18" charset="0"/>
-                                      <a:cs typeface="+mn-cs"/>
                                     </a:rPr>
                                     <m:t>𝜶</m:t>
                                   </m:r>
                                 </m:sub>
                               </m:sSub>
                               <m:r>
-                                <a:rPr lang="en-GB" sz="1800" b="1" i="1" kern="1200" smtClean="0">
+                                <a:rPr lang="en-GB" sz="1800" b="1" kern="1200" smtClean="0">
                                   <a:solidFill>
                                     <a:schemeClr val="dk1"/>
                                   </a:solidFill>
                                   <a:effectLst/>
-                                  <a:latin typeface="Cambria Math" panose="02040503050406030204" pitchFamily="18" charset="0"/>
-                                  <a:ea typeface="+mn-ea"/>
-                                  <a:cs typeface="+mn-cs"/>
                                 </a:rPr>
                                 <m:t>=</m:t>
                               </m:r>
                               <m:sSub>
                                 <m:sSubPr>
                                   <m:ctrlPr>
-                                    <a:rPr lang="en-GB" sz="1800" b="1" i="1" kern="1200" smtClean="0">
+                                    <a:rPr lang="en-GB" sz="1800" b="1" kern="1200" smtClean="0">
                                       <a:solidFill>
                                         <a:schemeClr val="dk1"/>
                                       </a:solidFill>
                                       <a:effectLst/>
-                                      <a:latin typeface="Cambria Math" panose="02040503050406030204" pitchFamily="18" charset="0"/>
-                                      <a:ea typeface="+mn-ea"/>
-                                      <a:cs typeface="+mn-cs"/>
                                     </a:rPr>
                                   </m:ctrlPr>
                                 </m:sSubPr>
                                 <m:e>
                                   <m:r>
-                                    <a:rPr lang="en-GB" sz="1800" b="1" i="1" kern="1200" smtClean="0">
+                                    <a:rPr lang="en-GB" sz="1800" b="1" kern="1200" smtClean="0">
                                       <a:solidFill>
                                         <a:schemeClr val="dk1"/>
                                       </a:solidFill>
                                       <a:effectLst/>
-                                      <a:latin typeface="Cambria Math" panose="02040503050406030204" pitchFamily="18" charset="0"/>
-                                      <a:ea typeface="Cambria Math" panose="02040503050406030204" pitchFamily="18" charset="0"/>
-                                      <a:cs typeface="+mn-cs"/>
                                     </a:rPr>
                                     <m:t>𝝁</m:t>
                                   </m:r>
                                 </m:e>
                                 <m:sub>
                                   <m:r>
-                                    <a:rPr lang="en-GB" sz="1800" b="1" i="1" kern="1200" smtClean="0">
+                                    <a:rPr lang="en-GB" sz="1800" b="1" kern="1200" smtClean="0">
                                       <a:solidFill>
                                         <a:schemeClr val="dk1"/>
                                       </a:solidFill>
                                       <a:effectLst/>
-                                      <a:latin typeface="Cambria Math" panose="02040503050406030204" pitchFamily="18" charset="0"/>
-                                      <a:ea typeface="+mn-ea"/>
-                                      <a:cs typeface="+mn-cs"/>
                                     </a:rPr>
                                     <m:t>𝒄𝒐𝒗</m:t>
                                   </m:r>
@@ -14626,97 +14641,67 @@
                             </m:oMath>
                           </a14:m>
                           <a:r>
-                            <a:rPr lang="en-GB" sz="1800" b="1" i="0" kern="1200" dirty="0">
+                            <a:rPr lang="en-GB" sz="1800" b="1" kern="1200" dirty="0">
                               <a:solidFill>
                                 <a:schemeClr val="dk1"/>
                               </a:solidFill>
                               <a:effectLst/>
-                              <a:latin typeface="+mn-lt"/>
-                              <a:ea typeface="+mn-ea"/>
-                              <a:cs typeface="+mn-cs"/>
                             </a:rPr>
                             <a:t>-</a:t>
                           </a:r>
                           <a14:m>
                             <m:oMath xmlns:m="http://schemas.openxmlformats.org/officeDocument/2006/math">
                               <m:r>
-                                <a:rPr lang="en-GB" sz="1800" b="1" i="0" kern="1200" smtClean="0">
+                                <a:rPr lang="en-GB" sz="1800" b="1" kern="1200" smtClean="0">
                                   <a:solidFill>
                                     <a:schemeClr val="dk1"/>
                                   </a:solidFill>
                                   <a:effectLst/>
-                                  <a:latin typeface="Cambria Math" panose="02040503050406030204" pitchFamily="18" charset="0"/>
-                                  <a:ea typeface="+mn-ea"/>
-                                  <a:cs typeface="+mn-cs"/>
                                 </a:rPr>
                                 <m:t> </m:t>
                               </m:r>
                               <m:sSub>
                                 <m:sSubPr>
                                   <m:ctrlPr>
-                                    <a:rPr lang="en-GB" sz="1800" b="1" i="1" kern="1200" smtClean="0">
+                                    <a:rPr lang="en-GB" sz="1800" b="1" kern="1200" smtClean="0">
                                       <a:solidFill>
                                         <a:schemeClr val="dk1"/>
                                       </a:solidFill>
                                       <a:effectLst/>
-                                      <a:latin typeface="Cambria Math" panose="02040503050406030204" pitchFamily="18" charset="0"/>
-                                      <a:ea typeface="+mn-ea"/>
-                                      <a:cs typeface="+mn-cs"/>
                                     </a:rPr>
                                   </m:ctrlPr>
                                 </m:sSubPr>
                                 <m:e>
                                   <m:r>
-                                    <a:rPr lang="en-GB" sz="1800" b="1" i="1" kern="1200" smtClean="0">
+                                    <a:rPr lang="en-GB" sz="1800" b="1" kern="1200" smtClean="0">
                                       <a:solidFill>
                                         <a:schemeClr val="dk1"/>
                                       </a:solidFill>
                                       <a:effectLst/>
-                                      <a:latin typeface="Cambria Math" panose="02040503050406030204" pitchFamily="18" charset="0"/>
-                                      <a:ea typeface="Cambria Math" panose="02040503050406030204" pitchFamily="18" charset="0"/>
-                                      <a:cs typeface="+mn-cs"/>
                                     </a:rPr>
                                     <m:t>𝝁</m:t>
                                   </m:r>
                                 </m:e>
                                 <m:sub>
                                   <m:r>
-                                    <a:rPr lang="en-GB" sz="1800" b="1" i="1" kern="1200" smtClean="0">
+                                    <a:rPr lang="en-GB" sz="1800" b="1" kern="1200" smtClean="0">
                                       <a:solidFill>
                                         <a:schemeClr val="dk1"/>
                                       </a:solidFill>
                                       <a:effectLst/>
-                                      <a:latin typeface="Cambria Math" panose="02040503050406030204" pitchFamily="18" charset="0"/>
-                                      <a:ea typeface="Cambria Math" panose="02040503050406030204" pitchFamily="18" charset="0"/>
-                                      <a:cs typeface="+mn-cs"/>
                                     </a:rPr>
-                                    <m:t>𝒑</m:t>
-                                  </m:r>
-                                  <m:r>
-                                    <a:rPr lang="en-GB" sz="1800" b="1" i="1" kern="1200" smtClean="0">
-                                      <a:solidFill>
-                                        <a:schemeClr val="dk1"/>
-                                      </a:solidFill>
-                                      <a:effectLst/>
-                                      <a:latin typeface="Cambria Math" panose="02040503050406030204" pitchFamily="18" charset="0"/>
-                                      <a:ea typeface="+mn-ea"/>
-                                      <a:cs typeface="+mn-cs"/>
-                                    </a:rPr>
-                                    <m:t>𝒓𝒆𝒄𝒐𝒗</m:t>
+                                    <m:t>𝒑𝒓𝒆𝒄𝒐𝒗</m:t>
                                   </m:r>
                                 </m:sub>
                               </m:sSub>
                             </m:oMath>
                           </a14:m>
                           <a:r>
-                            <a:rPr lang="en-GB" sz="1800" b="1" i="0" kern="1200" dirty="0">
+                            <a:rPr lang="en-GB" sz="1800" b="1" kern="1200" dirty="0">
                               <a:solidFill>
                                 <a:schemeClr val="dk1"/>
                               </a:solidFill>
                               <a:effectLst/>
-                              <a:latin typeface="+mn-lt"/>
-                              <a:ea typeface="+mn-ea"/>
-                              <a:cs typeface="+mn-cs"/>
                             </a:rPr>
                             <a:t> &gt; 0</a:t>
                           </a:r>
@@ -14739,14 +14724,11 @@
                             <a:tabLst/>
                             <a:defRPr/>
                           </a:pPr>
-                          <a:endParaRPr lang="en-GB" sz="1800" b="1" i="0" kern="1200" dirty="0">
+                          <a:endParaRPr lang="en-GB" sz="1800" b="1" kern="1200" dirty="0">
                             <a:solidFill>
                               <a:schemeClr val="dk1"/>
                             </a:solidFill>
                             <a:effectLst/>
-                            <a:latin typeface="+mn-lt"/>
-                            <a:ea typeface="+mn-ea"/>
-                            <a:cs typeface="+mn-cs"/>
                           </a:endParaRPr>
                         </a:p>
                         <a:p>
@@ -14768,17 +14750,23 @@
                             <a:defRPr/>
                           </a:pPr>
                           <a:r>
-                            <a:rPr lang="en-GB" sz="1800" b="1" i="0" kern="1200" dirty="0">
+                            <a:rPr lang="en-GB" sz="1800" b="1" kern="1200" dirty="0">
                               <a:solidFill>
                                 <a:schemeClr val="dk1"/>
                               </a:solidFill>
                               <a:effectLst/>
-                              <a:latin typeface="+mn-lt"/>
-                              <a:ea typeface="+mn-ea"/>
-                              <a:cs typeface="+mn-cs"/>
                             </a:rPr>
                             <a:t>Test Type: 2 sample dependent</a:t>
                           </a:r>
+                          <a:endParaRPr lang="en-GB" sz="1800" b="1" i="0" kern="1200" dirty="0">
+                            <a:solidFill>
+                              <a:schemeClr val="dk1"/>
+                            </a:solidFill>
+                            <a:effectLst/>
+                            <a:latin typeface="+mn-lt"/>
+                            <a:ea typeface="+mn-ea"/>
+                            <a:cs typeface="+mn-cs"/>
+                          </a:endParaRPr>
                         </a:p>
                       </a:txBody>
                       <a:tcPr/>
@@ -14789,38 +14777,23 @@
                         <a:lstStyle/>
                         <a:p>
                           <a:r>
-                            <a:rPr lang="el-GR" sz="1800" b="1" i="0" kern="1200" dirty="0">
+                            <a:rPr lang="el-GR" sz="1800" b="1" kern="1200" dirty="0">
                               <a:solidFill>
                                 <a:schemeClr val="dk1"/>
                               </a:solidFill>
                               <a:effectLst/>
-                              <a:latin typeface="+mn-lt"/>
-                              <a:ea typeface="+mn-ea"/>
-                              <a:cs typeface="+mn-cs"/>
                             </a:rPr>
                             <a:t>α</a:t>
                           </a:r>
                           <a:r>
-                            <a:rPr lang="en-GB" sz="1800" b="1" i="0" kern="1200" dirty="0">
+                            <a:rPr lang="en-GB" sz="1800" b="1" kern="1200" dirty="0">
                               <a:solidFill>
                                 <a:schemeClr val="dk1"/>
                               </a:solidFill>
                               <a:effectLst/>
-                              <a:latin typeface="+mn-lt"/>
-                              <a:ea typeface="+mn-ea"/>
-                              <a:cs typeface="+mn-cs"/>
                             </a:rPr>
                             <a:t> = 0.05</a:t>
                           </a:r>
-                          <a:endParaRPr lang="en-GB" sz="1800" b="1" i="1" kern="1200" dirty="0">
-                            <a:solidFill>
-                              <a:schemeClr val="dk1"/>
-                            </a:solidFill>
-                            <a:effectLst/>
-                            <a:latin typeface="Cambria Math" panose="02040503050406030204" pitchFamily="18" charset="0"/>
-                            <a:ea typeface="+mn-ea"/>
-                            <a:cs typeface="+mn-cs"/>
-                          </a:endParaRPr>
                         </a:p>
                         <a:p>
                           <a14:m>
@@ -14828,96 +14801,75 @@
                               <m:sSub>
                                 <m:sSubPr>
                                   <m:ctrlPr>
-                                    <a:rPr lang="en-GB" sz="1800" b="1" i="1" kern="1200" smtClean="0">
+                                    <a:rPr lang="en-GB" sz="1800" b="1" kern="1200" smtClean="0">
                                       <a:solidFill>
                                         <a:schemeClr val="dk1"/>
                                       </a:solidFill>
                                       <a:effectLst/>
-                                      <a:latin typeface="Cambria Math" panose="02040503050406030204" pitchFamily="18" charset="0"/>
-                                      <a:ea typeface="+mn-ea"/>
-                                      <a:cs typeface="+mn-cs"/>
                                     </a:rPr>
                                   </m:ctrlPr>
                                 </m:sSubPr>
                                 <m:e>
                                   <m:r>
-                                    <a:rPr lang="en-GB" sz="1800" b="1" i="1" kern="1200" smtClean="0">
+                                    <a:rPr lang="en-GB" sz="1800" b="1" kern="1200" smtClean="0">
                                       <a:solidFill>
                                         <a:schemeClr val="dk1"/>
                                       </a:solidFill>
                                       <a:effectLst/>
-                                      <a:latin typeface="Cambria Math" panose="02040503050406030204" pitchFamily="18" charset="0"/>
-                                      <a:ea typeface="+mn-ea"/>
-                                      <a:cs typeface="+mn-cs"/>
                                     </a:rPr>
                                     <m:t>𝑯</m:t>
                                   </m:r>
                                 </m:e>
                                 <m:sub>
                                   <m:r>
-                                    <a:rPr lang="en-GB" sz="1800" b="1" i="1" kern="1200" smtClean="0">
+                                    <a:rPr lang="en-GB" sz="1800" b="1" kern="1200" smtClean="0">
                                       <a:solidFill>
                                         <a:schemeClr val="dk1"/>
                                       </a:solidFill>
                                       <a:effectLst/>
-                                      <a:latin typeface="Cambria Math" panose="02040503050406030204" pitchFamily="18" charset="0"/>
-                                      <a:ea typeface="+mn-ea"/>
-                                      <a:cs typeface="+mn-cs"/>
                                     </a:rPr>
                                     <m:t>𝟎</m:t>
                                   </m:r>
                                 </m:sub>
                               </m:sSub>
                               <m:r>
-                                <a:rPr lang="en-GB" sz="1800" b="1" i="1" kern="1200" smtClean="0">
+                                <a:rPr lang="en-GB" sz="1800" b="1" kern="1200" smtClean="0">
                                   <a:solidFill>
                                     <a:schemeClr val="dk1"/>
                                   </a:solidFill>
                                   <a:effectLst/>
-                                  <a:latin typeface="Cambria Math" panose="02040503050406030204" pitchFamily="18" charset="0"/>
-                                  <a:ea typeface="+mn-ea"/>
-                                  <a:cs typeface="+mn-cs"/>
                                 </a:rPr>
                                 <m:t>=</m:t>
                               </m:r>
                               <m:sSub>
                                 <m:sSubPr>
                                   <m:ctrlPr>
-                                    <a:rPr lang="en-GB" sz="1800" b="1" i="1" kern="1200" smtClean="0">
+                                    <a:rPr lang="en-GB" sz="1800" b="1" kern="1200" smtClean="0">
                                       <a:solidFill>
                                         <a:schemeClr val="dk1"/>
                                       </a:solidFill>
                                       <a:effectLst/>
-                                      <a:latin typeface="Cambria Math" panose="02040503050406030204" pitchFamily="18" charset="0"/>
-                                      <a:ea typeface="+mn-ea"/>
-                                      <a:cs typeface="+mn-cs"/>
                                     </a:rPr>
                                   </m:ctrlPr>
                                 </m:sSubPr>
                                 <m:e>
                                   <m:r>
-                                    <a:rPr lang="en-GB" sz="1800" b="1" i="1" kern="1200" smtClean="0">
+                                    <a:rPr lang="en-GB" sz="1800" b="1" kern="1200" smtClean="0">
                                       <a:solidFill>
                                         <a:schemeClr val="dk1"/>
                                       </a:solidFill>
                                       <a:effectLst/>
-                                      <a:latin typeface="Cambria Math" panose="02040503050406030204" pitchFamily="18" charset="0"/>
-                                      <a:ea typeface="Cambria Math" panose="02040503050406030204" pitchFamily="18" charset="0"/>
-                                      <a:cs typeface="+mn-cs"/>
                                     </a:rPr>
                                     <m:t>𝝁</m:t>
                                   </m:r>
                                 </m:e>
                                 <m:sub>
                                   <m:r>
-                                    <a:rPr lang="en-GB" sz="1800" b="1" i="1" kern="1200" smtClean="0">
+                                    <a:rPr lang="en-GB" sz="1800" b="1" kern="1200" smtClean="0">
                                       <a:solidFill>
                                         <a:schemeClr val="dk1"/>
                                       </a:solidFill>
                                       <a:effectLst/>
-                                      <a:latin typeface="Cambria Math" panose="02040503050406030204" pitchFamily="18" charset="0"/>
-                                      <a:ea typeface="Cambria Math" panose="02040503050406030204" pitchFamily="18" charset="0"/>
-                                      <a:cs typeface="+mn-cs"/>
                                     </a:rPr>
                                     <m:t>𝒘𝒊𝒏𝒕𝒆𝒓</m:t>
                                   </m:r>
@@ -14926,69 +14878,54 @@
                             </m:oMath>
                           </a14:m>
                           <a:r>
-                            <a:rPr lang="en-GB" sz="1800" b="1" i="0" kern="1200" dirty="0">
+                            <a:rPr lang="en-GB" sz="1800" b="1" kern="1200" dirty="0">
                               <a:solidFill>
                                 <a:schemeClr val="dk1"/>
                               </a:solidFill>
                               <a:effectLst/>
-                              <a:latin typeface="+mn-lt"/>
-                              <a:ea typeface="+mn-ea"/>
-                              <a:cs typeface="+mn-cs"/>
                             </a:rPr>
                             <a:t>-</a:t>
                           </a:r>
                           <a14:m>
                             <m:oMath xmlns:m="http://schemas.openxmlformats.org/officeDocument/2006/math">
                               <m:r>
-                                <a:rPr lang="en-GB" sz="1800" b="1" i="0" kern="1200" smtClean="0">
+                                <a:rPr lang="en-GB" sz="1800" b="1" kern="1200" smtClean="0">
                                   <a:solidFill>
                                     <a:schemeClr val="dk1"/>
                                   </a:solidFill>
                                   <a:effectLst/>
-                                  <a:latin typeface="Cambria Math" panose="02040503050406030204" pitchFamily="18" charset="0"/>
-                                  <a:ea typeface="+mn-ea"/>
-                                  <a:cs typeface="+mn-cs"/>
                                 </a:rPr>
                                 <m:t> </m:t>
                               </m:r>
                               <m:sSub>
                                 <m:sSubPr>
                                   <m:ctrlPr>
-                                    <a:rPr lang="en-GB" sz="1800" b="1" i="1" kern="1200" smtClean="0">
+                                    <a:rPr lang="en-GB" sz="1800" b="1" kern="1200" smtClean="0">
                                       <a:solidFill>
                                         <a:schemeClr val="dk1"/>
                                       </a:solidFill>
                                       <a:effectLst/>
-                                      <a:latin typeface="Cambria Math" panose="02040503050406030204" pitchFamily="18" charset="0"/>
-                                      <a:ea typeface="+mn-ea"/>
-                                      <a:cs typeface="+mn-cs"/>
                                     </a:rPr>
                                   </m:ctrlPr>
                                 </m:sSubPr>
                                 <m:e>
                                   <m:r>
-                                    <a:rPr lang="en-GB" sz="1800" b="1" i="1" kern="1200" smtClean="0">
+                                    <a:rPr lang="en-GB" sz="1800" b="1" kern="1200" smtClean="0">
                                       <a:solidFill>
                                         <a:schemeClr val="dk1"/>
                                       </a:solidFill>
                                       <a:effectLst/>
-                                      <a:latin typeface="Cambria Math" panose="02040503050406030204" pitchFamily="18" charset="0"/>
-                                      <a:ea typeface="Cambria Math" panose="02040503050406030204" pitchFamily="18" charset="0"/>
-                                      <a:cs typeface="+mn-cs"/>
                                     </a:rPr>
                                     <m:t>𝝁</m:t>
                                   </m:r>
                                 </m:e>
                                 <m:sub>
                                   <m:r>
-                                    <a:rPr lang="en-GB" sz="1800" b="1" i="1" kern="1200" smtClean="0">
+                                    <a:rPr lang="en-GB" sz="1800" b="1" kern="1200" smtClean="0">
                                       <a:solidFill>
                                         <a:schemeClr val="dk1"/>
                                       </a:solidFill>
                                       <a:effectLst/>
-                                      <a:latin typeface="Cambria Math" panose="02040503050406030204" pitchFamily="18" charset="0"/>
-                                      <a:ea typeface="Cambria Math" panose="02040503050406030204" pitchFamily="18" charset="0"/>
-                                      <a:cs typeface="+mn-cs"/>
                                     </a:rPr>
                                     <m:t>𝒔𝒆𝒂𝒔𝒐𝒏</m:t>
                                   </m:r>
@@ -14997,14 +14934,11 @@
                             </m:oMath>
                           </a14:m>
                           <a:r>
-                            <a:rPr lang="en-GB" sz="1800" b="1" i="0" kern="1200" dirty="0">
+                            <a:rPr lang="en-GB" sz="1800" b="1" kern="1200" dirty="0">
                               <a:solidFill>
                                 <a:schemeClr val="dk1"/>
                               </a:solidFill>
                               <a:effectLst/>
-                              <a:latin typeface="+mn-lt"/>
-                              <a:ea typeface="+mn-ea"/>
-                              <a:cs typeface="+mn-cs"/>
                             </a:rPr>
                             <a:t> = 0</a:t>
                           </a:r>
@@ -15032,96 +14966,75 @@
                               <m:sSub>
                                 <m:sSubPr>
                                   <m:ctrlPr>
-                                    <a:rPr lang="en-GB" sz="1800" b="1" i="1" kern="1200" smtClean="0">
+                                    <a:rPr lang="en-GB" sz="1800" b="1" kern="1200" smtClean="0">
                                       <a:solidFill>
                                         <a:schemeClr val="dk1"/>
                                       </a:solidFill>
                                       <a:effectLst/>
-                                      <a:latin typeface="Cambria Math" panose="02040503050406030204" pitchFamily="18" charset="0"/>
-                                      <a:ea typeface="+mn-ea"/>
-                                      <a:cs typeface="+mn-cs"/>
                                     </a:rPr>
                                   </m:ctrlPr>
                                 </m:sSubPr>
                                 <m:e>
                                   <m:r>
-                                    <a:rPr lang="en-GB" sz="1800" b="1" i="1" kern="1200" smtClean="0">
+                                    <a:rPr lang="en-GB" sz="1800" b="1" kern="1200" smtClean="0">
                                       <a:solidFill>
                                         <a:schemeClr val="dk1"/>
                                       </a:solidFill>
                                       <a:effectLst/>
-                                      <a:latin typeface="Cambria Math" panose="02040503050406030204" pitchFamily="18" charset="0"/>
-                                      <a:ea typeface="+mn-ea"/>
-                                      <a:cs typeface="+mn-cs"/>
                                     </a:rPr>
                                     <m:t>𝑯</m:t>
                                   </m:r>
                                 </m:e>
                                 <m:sub>
                                   <m:r>
-                                    <a:rPr lang="en-GB" sz="1800" b="1" i="1" kern="1200" smtClean="0">
+                                    <a:rPr lang="en-GB" sz="1800" b="1" kern="1200" smtClean="0">
                                       <a:solidFill>
                                         <a:schemeClr val="dk1"/>
                                       </a:solidFill>
                                       <a:effectLst/>
-                                      <a:latin typeface="Cambria Math" panose="02040503050406030204" pitchFamily="18" charset="0"/>
-                                      <a:ea typeface="Cambria Math" panose="02040503050406030204" pitchFamily="18" charset="0"/>
-                                      <a:cs typeface="+mn-cs"/>
                                     </a:rPr>
                                     <m:t>𝜶</m:t>
                                   </m:r>
                                 </m:sub>
                               </m:sSub>
                               <m:r>
-                                <a:rPr lang="en-GB" sz="1800" b="1" i="1" kern="1200" smtClean="0">
+                                <a:rPr lang="en-GB" sz="1800" b="1" kern="1200" smtClean="0">
                                   <a:solidFill>
                                     <a:schemeClr val="dk1"/>
                                   </a:solidFill>
                                   <a:effectLst/>
-                                  <a:latin typeface="Cambria Math" panose="02040503050406030204" pitchFamily="18" charset="0"/>
-                                  <a:ea typeface="+mn-ea"/>
-                                  <a:cs typeface="+mn-cs"/>
                                 </a:rPr>
                                 <m:t>=</m:t>
                               </m:r>
                               <m:sSub>
                                 <m:sSubPr>
                                   <m:ctrlPr>
-                                    <a:rPr lang="en-GB" sz="1800" b="1" i="1" kern="1200" smtClean="0">
+                                    <a:rPr lang="en-GB" sz="1800" b="1" kern="1200" smtClean="0">
                                       <a:solidFill>
                                         <a:schemeClr val="dk1"/>
                                       </a:solidFill>
                                       <a:effectLst/>
-                                      <a:latin typeface="Cambria Math" panose="02040503050406030204" pitchFamily="18" charset="0"/>
-                                      <a:ea typeface="+mn-ea"/>
-                                      <a:cs typeface="+mn-cs"/>
                                     </a:rPr>
                                   </m:ctrlPr>
                                 </m:sSubPr>
                                 <m:e>
                                   <m:r>
-                                    <a:rPr lang="en-GB" sz="1800" b="1" i="1" kern="1200" smtClean="0">
+                                    <a:rPr lang="en-GB" sz="1800" b="1" kern="1200" smtClean="0">
                                       <a:solidFill>
                                         <a:schemeClr val="dk1"/>
                                       </a:solidFill>
                                       <a:effectLst/>
-                                      <a:latin typeface="Cambria Math" panose="02040503050406030204" pitchFamily="18" charset="0"/>
-                                      <a:ea typeface="Cambria Math" panose="02040503050406030204" pitchFamily="18" charset="0"/>
-                                      <a:cs typeface="+mn-cs"/>
                                     </a:rPr>
                                     <m:t>𝝁</m:t>
                                   </m:r>
                                 </m:e>
                                 <m:sub>
                                   <m:r>
-                                    <a:rPr lang="en-GB" sz="1800" b="1" i="1" kern="1200" smtClean="0">
+                                    <a:rPr lang="en-GB" sz="1800" b="1" kern="1200" smtClean="0">
                                       <a:solidFill>
                                         <a:schemeClr val="dk1"/>
                                       </a:solidFill>
                                       <a:effectLst/>
-                                      <a:latin typeface="Cambria Math" panose="02040503050406030204" pitchFamily="18" charset="0"/>
-                                      <a:ea typeface="Cambria Math" panose="02040503050406030204" pitchFamily="18" charset="0"/>
-                                      <a:cs typeface="+mn-cs"/>
                                     </a:rPr>
                                     <m:t>𝒘𝒊𝒏𝒕𝒆𝒓</m:t>
                                   </m:r>
@@ -15130,69 +15043,54 @@
                             </m:oMath>
                           </a14:m>
                           <a:r>
-                            <a:rPr lang="en-GB" sz="1800" b="1" i="0" kern="1200" dirty="0">
+                            <a:rPr lang="en-GB" sz="1800" b="1" kern="1200" dirty="0">
                               <a:solidFill>
                                 <a:schemeClr val="dk1"/>
                               </a:solidFill>
                               <a:effectLst/>
-                              <a:latin typeface="+mn-lt"/>
-                              <a:ea typeface="+mn-ea"/>
-                              <a:cs typeface="+mn-cs"/>
                             </a:rPr>
                             <a:t>-</a:t>
                           </a:r>
                           <a14:m>
                             <m:oMath xmlns:m="http://schemas.openxmlformats.org/officeDocument/2006/math">
                               <m:r>
-                                <a:rPr lang="en-GB" sz="1800" b="1" i="0" kern="1200" smtClean="0">
+                                <a:rPr lang="en-GB" sz="1800" b="1" kern="1200" smtClean="0">
                                   <a:solidFill>
                                     <a:schemeClr val="dk1"/>
                                   </a:solidFill>
                                   <a:effectLst/>
-                                  <a:latin typeface="Cambria Math" panose="02040503050406030204" pitchFamily="18" charset="0"/>
-                                  <a:ea typeface="+mn-ea"/>
-                                  <a:cs typeface="+mn-cs"/>
                                 </a:rPr>
                                 <m:t> </m:t>
                               </m:r>
                               <m:sSub>
                                 <m:sSubPr>
                                   <m:ctrlPr>
-                                    <a:rPr lang="en-GB" sz="1800" b="1" i="1" kern="1200" smtClean="0">
+                                    <a:rPr lang="en-GB" sz="1800" b="1" kern="1200" smtClean="0">
                                       <a:solidFill>
                                         <a:schemeClr val="dk1"/>
                                       </a:solidFill>
                                       <a:effectLst/>
-                                      <a:latin typeface="Cambria Math" panose="02040503050406030204" pitchFamily="18" charset="0"/>
-                                      <a:ea typeface="+mn-ea"/>
-                                      <a:cs typeface="+mn-cs"/>
                                     </a:rPr>
                                   </m:ctrlPr>
                                 </m:sSubPr>
                                 <m:e>
                                   <m:r>
-                                    <a:rPr lang="en-GB" sz="1800" b="1" i="1" kern="1200" smtClean="0">
+                                    <a:rPr lang="en-GB" sz="1800" b="1" kern="1200" smtClean="0">
                                       <a:solidFill>
                                         <a:schemeClr val="dk1"/>
                                       </a:solidFill>
                                       <a:effectLst/>
-                                      <a:latin typeface="Cambria Math" panose="02040503050406030204" pitchFamily="18" charset="0"/>
-                                      <a:ea typeface="Cambria Math" panose="02040503050406030204" pitchFamily="18" charset="0"/>
-                                      <a:cs typeface="+mn-cs"/>
                                     </a:rPr>
                                     <m:t>𝝁</m:t>
                                   </m:r>
                                 </m:e>
                                 <m:sub>
                                   <m:r>
-                                    <a:rPr lang="en-GB" sz="1800" b="1" i="1" kern="1200" smtClean="0">
+                                    <a:rPr lang="en-GB" sz="1800" b="1" kern="1200" smtClean="0">
                                       <a:solidFill>
                                         <a:schemeClr val="dk1"/>
                                       </a:solidFill>
                                       <a:effectLst/>
-                                      <a:latin typeface="Cambria Math" panose="02040503050406030204" pitchFamily="18" charset="0"/>
-                                      <a:ea typeface="Cambria Math" panose="02040503050406030204" pitchFamily="18" charset="0"/>
-                                      <a:cs typeface="+mn-cs"/>
                                     </a:rPr>
                                     <m:t>𝒔𝒆𝒂𝒔𝒐𝒏</m:t>
                                   </m:r>
@@ -15201,14 +15099,11 @@
                             </m:oMath>
                           </a14:m>
                           <a:r>
-                            <a:rPr lang="en-GB" sz="1800" b="1" i="0" kern="1200" dirty="0">
+                            <a:rPr lang="en-GB" sz="1800" b="1" kern="1200" dirty="0">
                               <a:solidFill>
                                 <a:schemeClr val="dk1"/>
                               </a:solidFill>
                               <a:effectLst/>
-                              <a:latin typeface="+mn-lt"/>
-                              <a:ea typeface="+mn-ea"/>
-                              <a:cs typeface="+mn-cs"/>
                             </a:rPr>
                             <a:t> &gt; 0</a:t>
                           </a:r>
@@ -15231,14 +15126,11 @@
                             <a:tabLst/>
                             <a:defRPr/>
                           </a:pPr>
-                          <a:endParaRPr lang="en-GB" sz="1800" b="1" i="0" kern="1200" dirty="0">
+                          <a:endParaRPr lang="en-GB" sz="1800" b="1" kern="1200" dirty="0">
                             <a:solidFill>
                               <a:schemeClr val="dk1"/>
                             </a:solidFill>
                             <a:effectLst/>
-                            <a:latin typeface="+mn-lt"/>
-                            <a:ea typeface="+mn-ea"/>
-                            <a:cs typeface="+mn-cs"/>
                           </a:endParaRPr>
                         </a:p>
                         <a:p>
@@ -15260,17 +15152,23 @@
                             <a:defRPr/>
                           </a:pPr>
                           <a:r>
-                            <a:rPr lang="en-GB" sz="1800" b="1" i="0" kern="1200" dirty="0">
+                            <a:rPr lang="en-GB" sz="1800" b="1" kern="1200" dirty="0">
                               <a:solidFill>
                                 <a:schemeClr val="dk1"/>
                               </a:solidFill>
                               <a:effectLst/>
-                              <a:latin typeface="+mn-lt"/>
-                              <a:ea typeface="+mn-ea"/>
-                              <a:cs typeface="+mn-cs"/>
                             </a:rPr>
                             <a:t>Test Type: 2 sample independent</a:t>
                           </a:r>
+                          <a:endParaRPr lang="en-GB" sz="1800" b="1" i="0" kern="1200" dirty="0">
+                            <a:solidFill>
+                              <a:schemeClr val="dk1"/>
+                            </a:solidFill>
+                            <a:effectLst/>
+                            <a:latin typeface="+mn-lt"/>
+                            <a:ea typeface="+mn-ea"/>
+                            <a:cs typeface="+mn-cs"/>
+                          </a:endParaRPr>
                         </a:p>
                       </a:txBody>
                       <a:tcPr/>
@@ -15367,41 +15265,32 @@
                               <m:sSub>
                                 <m:sSubPr>
                                   <m:ctrlPr>
-                                    <a:rPr lang="en-GB" sz="1800" b="1" i="1" kern="1200" smtClean="0">
+                                    <a:rPr lang="en-GB" sz="1800" b="1" kern="1200" smtClean="0">
                                       <a:solidFill>
                                         <a:schemeClr val="dk1"/>
                                       </a:solidFill>
                                       <a:effectLst/>
-                                      <a:latin typeface="Cambria Math" panose="02040503050406030204" pitchFamily="18" charset="0"/>
-                                      <a:ea typeface="+mn-ea"/>
-                                      <a:cs typeface="+mn-cs"/>
                                     </a:rPr>
                                   </m:ctrlPr>
                                 </m:sSubPr>
                                 <m:e>
                                   <m:r>
-                                    <a:rPr lang="en-GB" sz="1800" b="1" i="1" kern="1200" smtClean="0">
+                                    <a:rPr lang="en-GB" sz="1800" b="1" kern="1200" smtClean="0">
                                       <a:solidFill>
                                         <a:schemeClr val="dk1"/>
                                       </a:solidFill>
                                       <a:effectLst/>
-                                      <a:latin typeface="Cambria Math" panose="02040503050406030204" pitchFamily="18" charset="0"/>
-                                      <a:ea typeface="+mn-ea"/>
-                                      <a:cs typeface="+mn-cs"/>
                                     </a:rPr>
                                     <m:t>𝑯</m:t>
                                   </m:r>
                                 </m:e>
                                 <m:sub>
                                   <m:r>
-                                    <a:rPr lang="en-GB" sz="1800" b="1" i="1" kern="1200" smtClean="0">
+                                    <a:rPr lang="en-GB" sz="1800" b="1" kern="1200" smtClean="0">
                                       <a:solidFill>
                                         <a:schemeClr val="dk1"/>
                                       </a:solidFill>
                                       <a:effectLst/>
-                                      <a:latin typeface="Cambria Math" panose="02040503050406030204" pitchFamily="18" charset="0"/>
-                                      <a:ea typeface="+mn-ea"/>
-                                      <a:cs typeface="+mn-cs"/>
                                     </a:rPr>
                                     <m:t>𝟎</m:t>
                                   </m:r>
@@ -15415,8 +15304,6 @@
                                 <a:schemeClr val="dk1"/>
                               </a:solidFill>
                               <a:effectLst/>
-                              <a:ea typeface="+mn-ea"/>
-                              <a:cs typeface="+mn-cs"/>
                             </a:rPr>
                             <a:t> </a:t>
                           </a:r>
@@ -15427,8 +15314,6 @@
                               <a:schemeClr val="dk1"/>
                             </a:solidFill>
                             <a:effectLst/>
-                            <a:ea typeface="+mn-ea"/>
-                            <a:cs typeface="+mn-cs"/>
                           </a:endParaRPr>
                         </a:p>
                         <a:p>
@@ -15451,41 +15336,32 @@
                               <m:sSub>
                                 <m:sSubPr>
                                   <m:ctrlPr>
-                                    <a:rPr lang="en-GB" sz="1800" b="1" i="1" kern="1200" smtClean="0">
+                                    <a:rPr lang="en-GB" sz="1800" b="1" kern="1200" smtClean="0">
                                       <a:solidFill>
                                         <a:schemeClr val="dk1"/>
                                       </a:solidFill>
                                       <a:effectLst/>
-                                      <a:latin typeface="Cambria Math" panose="02040503050406030204" pitchFamily="18" charset="0"/>
-                                      <a:ea typeface="+mn-ea"/>
-                                      <a:cs typeface="+mn-cs"/>
                                     </a:rPr>
                                   </m:ctrlPr>
                                 </m:sSubPr>
                                 <m:e>
                                   <m:r>
-                                    <a:rPr lang="en-GB" sz="1800" b="1" i="1" kern="1200" smtClean="0">
+                                    <a:rPr lang="en-GB" sz="1800" b="1" kern="1200" smtClean="0">
                                       <a:solidFill>
                                         <a:schemeClr val="dk1"/>
                                       </a:solidFill>
                                       <a:effectLst/>
-                                      <a:latin typeface="Cambria Math" panose="02040503050406030204" pitchFamily="18" charset="0"/>
-                                      <a:ea typeface="+mn-ea"/>
-                                      <a:cs typeface="+mn-cs"/>
                                     </a:rPr>
                                     <m:t>𝑯</m:t>
                                   </m:r>
                                 </m:e>
                                 <m:sub>
                                   <m:r>
-                                    <a:rPr lang="en-GB" sz="1800" b="1" i="1" kern="1200" smtClean="0">
+                                    <a:rPr lang="en-GB" sz="1800" b="1" kern="1200" smtClean="0">
                                       <a:solidFill>
                                         <a:schemeClr val="dk1"/>
                                       </a:solidFill>
                                       <a:effectLst/>
-                                      <a:latin typeface="Cambria Math" panose="02040503050406030204" pitchFamily="18" charset="0"/>
-                                      <a:ea typeface="+mn-ea"/>
-                                      <a:cs typeface="+mn-cs"/>
                                     </a:rPr>
                                     <m:t>𝟎</m:t>
                                   </m:r>
@@ -15528,7 +15404,7 @@
               <p:nvPr>
                 <p:extLst>
                   <p:ext uri="{D42A27DB-BD31-4B8C-83A1-F6EECF244321}">
-                    <p14:modId xmlns:p14="http://schemas.microsoft.com/office/powerpoint/2010/main" val="2241294273"/>
+                    <p14:modId xmlns:p14="http://schemas.microsoft.com/office/powerpoint/2010/main" val="132383291"/>
                   </p:ext>
                 </p:extLst>
               </p:nvPr>
@@ -15541,7 +15417,7 @@
               <a:graphicData uri="http://schemas.openxmlformats.org/drawingml/2006/table">
                 <a:tbl>
                   <a:tblPr firstRow="1" bandRow="1">
-                    <a:tableStyleId>{5C22544A-7EE6-4342-B048-85BDC9FD1C3A}</a:tableStyleId>
+                    <a:tableStyleId>{00A15C55-8517-42AA-B614-E9B94910E393}</a:tableStyleId>
                   </a:tblPr>
                   <a:tblGrid>
                     <a:gridCol w="1753409">
@@ -15648,17 +15524,23 @@
                             <a:defRPr/>
                           </a:pPr>
                           <a:r>
-                            <a:rPr lang="en-GB" sz="1800" b="1" i="0" kern="1200" dirty="0">
+                            <a:rPr lang="en-GB" sz="1800" b="1" kern="1200" dirty="0">
                               <a:solidFill>
                                 <a:schemeClr val="dk1"/>
                               </a:solidFill>
                               <a:effectLst/>
-                              <a:latin typeface="+mn-lt"/>
-                              <a:ea typeface="+mn-ea"/>
-                              <a:cs typeface="+mn-cs"/>
                             </a:rPr>
                             <a:t>Setup:</a:t>
                           </a:r>
+                          <a:endParaRPr lang="en-GB" sz="1800" b="1" i="0" kern="1200" dirty="0">
+                            <a:solidFill>
+                              <a:schemeClr val="dk1"/>
+                            </a:solidFill>
+                            <a:effectLst/>
+                            <a:latin typeface="+mn-lt"/>
+                            <a:ea typeface="+mn-ea"/>
+                            <a:cs typeface="+mn-cs"/>
+                          </a:endParaRPr>
                         </a:p>
                       </a:txBody>
                       <a:tcPr/>
@@ -15673,7 +15555,7 @@
                       </a:txBody>
                       <a:tcPr>
                         <a:blipFill>
-                          <a:blip r:embed="rId2"/>
+                          <a:blip r:embed="rId3"/>
                           <a:stretch>
                             <a:fillRect l="-43590" t="-46774" r="-102112" b="-121774"/>
                           </a:stretch>
@@ -15690,7 +15572,7 @@
                       </a:txBody>
                       <a:tcPr>
                         <a:blipFill>
-                          <a:blip r:embed="rId2"/>
+                          <a:blip r:embed="rId3"/>
                           <a:stretch>
                             <a:fillRect l="-141456" t="-46774" r="-594" b="-121774"/>
                           </a:stretch>
@@ -15785,7 +15667,7 @@
                       </a:txBody>
                       <a:tcPr>
                         <a:blipFill>
-                          <a:blip r:embed="rId2"/>
+                          <a:blip r:embed="rId3"/>
                           <a:stretch>
                             <a:fillRect l="-43590" t="-342667" r="-102112" b="-1333"/>
                           </a:stretch>
@@ -15802,7 +15684,7 @@
                       </a:txBody>
                       <a:tcPr>
                         <a:blipFill>
-                          <a:blip r:embed="rId2"/>
+                          <a:blip r:embed="rId3"/>
                           <a:stretch>
                             <a:fillRect l="-141456" t="-342667" r="-594" b="-1333"/>
                           </a:stretch>

</xml_diff>

<commit_message>
Revert "wee update presentation"
This reverts commit 41cda4ecfab95c8ca58bd7b535b3c8aca8697724.
</commit_message>
<xml_diff>
--- a/Presentation/PHS Rshiny Team Klas.pptx
+++ b/Presentation/PHS Rshiny Team Klas.pptx
@@ -14121,69 +14121,6 @@
           </a:p>
         </p:txBody>
       </p:sp>
-      <p:sp>
-        <p:nvSpPr>
-          <p:cNvPr id="16" name="Title 1">
-            <a:extLst>
-              <a:ext uri="{FF2B5EF4-FFF2-40B4-BE49-F238E27FC236}">
-                <a16:creationId xmlns:a16="http://schemas.microsoft.com/office/drawing/2014/main" id="{28DAB9DF-EF8B-484A-9B1F-68036316C2B8}"/>
-              </a:ext>
-            </a:extLst>
-          </p:cNvPr>
-          <p:cNvSpPr txBox="1">
-            <a:spLocks/>
-          </p:cNvSpPr>
-          <p:nvPr/>
-        </p:nvSpPr>
-        <p:spPr>
-          <a:xfrm>
-            <a:off x="487928" y="105157"/>
-            <a:ext cx="8610600" cy="1293028"/>
-          </a:xfrm>
-          <a:prstGeom prst="rect">
-            <a:avLst/>
-          </a:prstGeom>
-        </p:spPr>
-        <p:txBody>
-          <a:bodyPr>
-            <a:normAutofit/>
-          </a:bodyPr>
-          <a:lstStyle>
-            <a:lvl1pPr algn="r" defTabSz="914400" rtl="0" eaLnBrk="1" latinLnBrk="0" hangingPunct="1">
-              <a:lnSpc>
-                <a:spcPct val="90000"/>
-              </a:lnSpc>
-              <a:spcBef>
-                <a:spcPct val="0"/>
-              </a:spcBef>
-              <a:buNone/>
-              <a:defRPr sz="4000" kern="1200" cap="all" baseline="0">
-                <a:solidFill>
-                  <a:schemeClr val="tx1"/>
-                </a:solidFill>
-                <a:latin typeface="+mj-lt"/>
-                <a:ea typeface="+mj-ea"/>
-                <a:cs typeface="+mj-cs"/>
-              </a:defRPr>
-            </a:lvl1pPr>
-          </a:lstStyle>
-          <a:p>
-            <a:pPr algn="l"/>
-            <a:r>
-              <a:rPr lang="en-US" b="1" dirty="0">
-                <a:solidFill>
-                  <a:schemeClr val="bg2"/>
-                </a:solidFill>
-              </a:rPr>
-              <a:t>The dashboard</a:t>
-            </a:r>
-            <a:br>
-              <a:rPr lang="en-US" dirty="0"/>
-            </a:br>
-            <a:endParaRPr lang="en-US" dirty="0"/>
-          </a:p>
-        </p:txBody>
-      </p:sp>
     </p:spTree>
     <p:extLst>
       <p:ext uri="{BB962C8B-B14F-4D97-AF65-F5344CB8AC3E}">
@@ -14291,7 +14228,7 @@
               <p:nvPr>
                 <p:extLst>
                   <p:ext uri="{D42A27DB-BD31-4B8C-83A1-F6EECF244321}">
-                    <p14:modId xmlns:p14="http://schemas.microsoft.com/office/powerpoint/2010/main" val="2705779665"/>
+                    <p14:modId xmlns:p14="http://schemas.microsoft.com/office/powerpoint/2010/main" val="132383291"/>
                   </p:ext>
                 </p:extLst>
               </p:nvPr>
@@ -14462,12 +14399,11 @@
                               <m:sSub>
                                 <m:sSubPr>
                                   <m:ctrlPr>
-                                    <a:rPr lang="en-GB" sz="1800" b="1" i="1" kern="1200" smtClean="0">
+                                    <a:rPr lang="en-GB" sz="1800" b="1" kern="1200" smtClean="0">
                                       <a:solidFill>
                                         <a:schemeClr val="dk1"/>
                                       </a:solidFill>
                                       <a:effectLst/>
-                                      <a:latin typeface="Cambria Math" panose="02040503050406030204" pitchFamily="18" charset="0"/>
                                     </a:rPr>
                                   </m:ctrlPr>
                                 </m:sSubPr>
@@ -14478,7 +14414,6 @@
                                         <a:schemeClr val="dk1"/>
                                       </a:solidFill>
                                       <a:effectLst/>
-                                      <a:latin typeface="Cambria Math" panose="02040503050406030204" pitchFamily="18" charset="0"/>
                                     </a:rPr>
                                     <m:t>𝑯</m:t>
                                   </m:r>
@@ -14490,7 +14425,6 @@
                                         <a:schemeClr val="dk1"/>
                                       </a:solidFill>
                                       <a:effectLst/>
-                                      <a:latin typeface="Cambria Math" panose="02040503050406030204" pitchFamily="18" charset="0"/>
                                     </a:rPr>
                                     <m:t>𝟎</m:t>
                                   </m:r>
@@ -14502,19 +14436,17 @@
                                     <a:schemeClr val="dk1"/>
                                   </a:solidFill>
                                   <a:effectLst/>
-                                  <a:latin typeface="Cambria Math" panose="02040503050406030204" pitchFamily="18" charset="0"/>
                                 </a:rPr>
                                 <m:t>=</m:t>
                               </m:r>
                               <m:sSub>
                                 <m:sSubPr>
                                   <m:ctrlPr>
-                                    <a:rPr lang="en-GB" sz="1800" b="1" i="1" kern="1200" smtClean="0">
+                                    <a:rPr lang="en-GB" sz="1800" b="1" kern="1200" smtClean="0">
                                       <a:solidFill>
                                         <a:schemeClr val="dk1"/>
                                       </a:solidFill>
                                       <a:effectLst/>
-                                      <a:latin typeface="Cambria Math" panose="02040503050406030204" pitchFamily="18" charset="0"/>
                                     </a:rPr>
                                   </m:ctrlPr>
                                 </m:sSubPr>
@@ -14525,7 +14457,6 @@
                                         <a:schemeClr val="dk1"/>
                                       </a:solidFill>
                                       <a:effectLst/>
-                                      <a:latin typeface="Cambria Math" panose="02040503050406030204" pitchFamily="18" charset="0"/>
                                     </a:rPr>
                                     <m:t>𝝁</m:t>
                                   </m:r>
@@ -14537,7 +14468,6 @@
                                         <a:schemeClr val="dk1"/>
                                       </a:solidFill>
                                       <a:effectLst/>
-                                      <a:latin typeface="Cambria Math" panose="02040503050406030204" pitchFamily="18" charset="0"/>
                                     </a:rPr>
                                     <m:t>𝒄𝒐𝒗</m:t>
                                   </m:r>
@@ -14562,19 +14492,17 @@
                                     <a:schemeClr val="dk1"/>
                                   </a:solidFill>
                                   <a:effectLst/>
-                                  <a:latin typeface="Cambria Math" panose="02040503050406030204" pitchFamily="18" charset="0"/>
                                 </a:rPr>
                                 <m:t> </m:t>
                               </m:r>
                               <m:sSub>
                                 <m:sSubPr>
                                   <m:ctrlPr>
-                                    <a:rPr lang="en-GB" sz="1800" b="1" i="1" kern="1200" smtClean="0">
+                                    <a:rPr lang="en-GB" sz="1800" b="1" kern="1200" smtClean="0">
                                       <a:solidFill>
                                         <a:schemeClr val="dk1"/>
                                       </a:solidFill>
                                       <a:effectLst/>
-                                      <a:latin typeface="Cambria Math" panose="02040503050406030204" pitchFamily="18" charset="0"/>
                                     </a:rPr>
                                   </m:ctrlPr>
                                 </m:sSubPr>
@@ -14585,7 +14513,6 @@
                                         <a:schemeClr val="dk1"/>
                                       </a:solidFill>
                                       <a:effectLst/>
-                                      <a:latin typeface="Cambria Math" panose="02040503050406030204" pitchFamily="18" charset="0"/>
                                     </a:rPr>
                                     <m:t>𝝁</m:t>
                                   </m:r>
@@ -14597,7 +14524,6 @@
                                         <a:schemeClr val="dk1"/>
                                       </a:solidFill>
                                       <a:effectLst/>
-                                      <a:latin typeface="Cambria Math" panose="02040503050406030204" pitchFamily="18" charset="0"/>
                                     </a:rPr>
                                     <m:t>𝒑𝒓𝒆𝒄𝒐𝒗</m:t>
                                   </m:r>
@@ -14638,12 +14564,11 @@
                               <m:sSub>
                                 <m:sSubPr>
                                   <m:ctrlPr>
-                                    <a:rPr lang="en-GB" sz="1800" b="1" i="1" kern="1200" smtClean="0">
+                                    <a:rPr lang="en-GB" sz="1800" b="1" kern="1200" smtClean="0">
                                       <a:solidFill>
                                         <a:schemeClr val="dk1"/>
                                       </a:solidFill>
                                       <a:effectLst/>
-                                      <a:latin typeface="Cambria Math" panose="02040503050406030204" pitchFamily="18" charset="0"/>
                                     </a:rPr>
                                   </m:ctrlPr>
                                 </m:sSubPr>
@@ -14654,7 +14579,6 @@
                                         <a:schemeClr val="dk1"/>
                                       </a:solidFill>
                                       <a:effectLst/>
-                                      <a:latin typeface="Cambria Math" panose="02040503050406030204" pitchFamily="18" charset="0"/>
                                     </a:rPr>
                                     <m:t>𝑯</m:t>
                                   </m:r>
@@ -14666,7 +14590,6 @@
                                         <a:schemeClr val="dk1"/>
                                       </a:solidFill>
                                       <a:effectLst/>
-                                      <a:latin typeface="Cambria Math" panose="02040503050406030204" pitchFamily="18" charset="0"/>
                                     </a:rPr>
                                     <m:t>𝜶</m:t>
                                   </m:r>
@@ -14678,19 +14601,17 @@
                                     <a:schemeClr val="dk1"/>
                                   </a:solidFill>
                                   <a:effectLst/>
-                                  <a:latin typeface="Cambria Math" panose="02040503050406030204" pitchFamily="18" charset="0"/>
                                 </a:rPr>
                                 <m:t>=</m:t>
                               </m:r>
                               <m:sSub>
                                 <m:sSubPr>
                                   <m:ctrlPr>
-                                    <a:rPr lang="en-GB" sz="1800" b="1" i="1" kern="1200" smtClean="0">
+                                    <a:rPr lang="en-GB" sz="1800" b="1" kern="1200" smtClean="0">
                                       <a:solidFill>
                                         <a:schemeClr val="dk1"/>
                                       </a:solidFill>
                                       <a:effectLst/>
-                                      <a:latin typeface="Cambria Math" panose="02040503050406030204" pitchFamily="18" charset="0"/>
                                     </a:rPr>
                                   </m:ctrlPr>
                                 </m:sSubPr>
@@ -14701,7 +14622,6 @@
                                         <a:schemeClr val="dk1"/>
                                       </a:solidFill>
                                       <a:effectLst/>
-                                      <a:latin typeface="Cambria Math" panose="02040503050406030204" pitchFamily="18" charset="0"/>
                                     </a:rPr>
                                     <m:t>𝝁</m:t>
                                   </m:r>
@@ -14713,7 +14633,6 @@
                                         <a:schemeClr val="dk1"/>
                                       </a:solidFill>
                                       <a:effectLst/>
-                                      <a:latin typeface="Cambria Math" panose="02040503050406030204" pitchFamily="18" charset="0"/>
                                     </a:rPr>
                                     <m:t>𝒄𝒐𝒗</m:t>
                                   </m:r>
@@ -14738,19 +14657,17 @@
                                     <a:schemeClr val="dk1"/>
                                   </a:solidFill>
                                   <a:effectLst/>
-                                  <a:latin typeface="Cambria Math" panose="02040503050406030204" pitchFamily="18" charset="0"/>
                                 </a:rPr>
                                 <m:t> </m:t>
                               </m:r>
                               <m:sSub>
                                 <m:sSubPr>
                                   <m:ctrlPr>
-                                    <a:rPr lang="en-GB" sz="1800" b="1" i="1" kern="1200" smtClean="0">
+                                    <a:rPr lang="en-GB" sz="1800" b="1" kern="1200" smtClean="0">
                                       <a:solidFill>
                                         <a:schemeClr val="dk1"/>
                                       </a:solidFill>
                                       <a:effectLst/>
-                                      <a:latin typeface="Cambria Math" panose="02040503050406030204" pitchFamily="18" charset="0"/>
                                     </a:rPr>
                                   </m:ctrlPr>
                                 </m:sSubPr>
@@ -14761,7 +14678,6 @@
                                         <a:schemeClr val="dk1"/>
                                       </a:solidFill>
                                       <a:effectLst/>
-                                      <a:latin typeface="Cambria Math" panose="02040503050406030204" pitchFamily="18" charset="0"/>
                                     </a:rPr>
                                     <m:t>𝝁</m:t>
                                   </m:r>
@@ -14773,7 +14689,6 @@
                                         <a:schemeClr val="dk1"/>
                                       </a:solidFill>
                                       <a:effectLst/>
-                                      <a:latin typeface="Cambria Math" panose="02040503050406030204" pitchFamily="18" charset="0"/>
                                     </a:rPr>
                                     <m:t>𝒑𝒓𝒆𝒄𝒐𝒗</m:t>
                                   </m:r>
@@ -14886,12 +14801,11 @@
                               <m:sSub>
                                 <m:sSubPr>
                                   <m:ctrlPr>
-                                    <a:rPr lang="en-GB" sz="1800" b="1" i="1" kern="1200" smtClean="0">
+                                    <a:rPr lang="en-GB" sz="1800" b="1" kern="1200" smtClean="0">
                                       <a:solidFill>
                                         <a:schemeClr val="dk1"/>
                                       </a:solidFill>
                                       <a:effectLst/>
-                                      <a:latin typeface="Cambria Math" panose="02040503050406030204" pitchFamily="18" charset="0"/>
                                     </a:rPr>
                                   </m:ctrlPr>
                                 </m:sSubPr>
@@ -14902,7 +14816,6 @@
                                         <a:schemeClr val="dk1"/>
                                       </a:solidFill>
                                       <a:effectLst/>
-                                      <a:latin typeface="Cambria Math" panose="02040503050406030204" pitchFamily="18" charset="0"/>
                                     </a:rPr>
                                     <m:t>𝑯</m:t>
                                   </m:r>
@@ -14914,7 +14827,6 @@
                                         <a:schemeClr val="dk1"/>
                                       </a:solidFill>
                                       <a:effectLst/>
-                                      <a:latin typeface="Cambria Math" panose="02040503050406030204" pitchFamily="18" charset="0"/>
                                     </a:rPr>
                                     <m:t>𝟎</m:t>
                                   </m:r>
@@ -14926,19 +14838,17 @@
                                     <a:schemeClr val="dk1"/>
                                   </a:solidFill>
                                   <a:effectLst/>
-                                  <a:latin typeface="Cambria Math" panose="02040503050406030204" pitchFamily="18" charset="0"/>
                                 </a:rPr>
                                 <m:t>=</m:t>
                               </m:r>
                               <m:sSub>
                                 <m:sSubPr>
                                   <m:ctrlPr>
-                                    <a:rPr lang="en-GB" sz="1800" b="1" i="1" kern="1200" smtClean="0">
+                                    <a:rPr lang="en-GB" sz="1800" b="1" kern="1200" smtClean="0">
                                       <a:solidFill>
                                         <a:schemeClr val="dk1"/>
                                       </a:solidFill>
                                       <a:effectLst/>
-                                      <a:latin typeface="Cambria Math" panose="02040503050406030204" pitchFamily="18" charset="0"/>
                                     </a:rPr>
                                   </m:ctrlPr>
                                 </m:sSubPr>
@@ -14949,7 +14859,6 @@
                                         <a:schemeClr val="dk1"/>
                                       </a:solidFill>
                                       <a:effectLst/>
-                                      <a:latin typeface="Cambria Math" panose="02040503050406030204" pitchFamily="18" charset="0"/>
                                     </a:rPr>
                                     <m:t>𝝁</m:t>
                                   </m:r>
@@ -14961,7 +14870,6 @@
                                         <a:schemeClr val="dk1"/>
                                       </a:solidFill>
                                       <a:effectLst/>
-                                      <a:latin typeface="Cambria Math" panose="02040503050406030204" pitchFamily="18" charset="0"/>
                                     </a:rPr>
                                     <m:t>𝒘𝒊𝒏𝒕𝒆𝒓</m:t>
                                   </m:r>
@@ -14986,19 +14894,17 @@
                                     <a:schemeClr val="dk1"/>
                                   </a:solidFill>
                                   <a:effectLst/>
-                                  <a:latin typeface="Cambria Math" panose="02040503050406030204" pitchFamily="18" charset="0"/>
                                 </a:rPr>
                                 <m:t> </m:t>
                               </m:r>
                               <m:sSub>
                                 <m:sSubPr>
                                   <m:ctrlPr>
-                                    <a:rPr lang="en-GB" sz="1800" b="1" i="1" kern="1200" smtClean="0">
+                                    <a:rPr lang="en-GB" sz="1800" b="1" kern="1200" smtClean="0">
                                       <a:solidFill>
                                         <a:schemeClr val="dk1"/>
                                       </a:solidFill>
                                       <a:effectLst/>
-                                      <a:latin typeface="Cambria Math" panose="02040503050406030204" pitchFamily="18" charset="0"/>
                                     </a:rPr>
                                   </m:ctrlPr>
                                 </m:sSubPr>
@@ -15009,7 +14915,6 @@
                                         <a:schemeClr val="dk1"/>
                                       </a:solidFill>
                                       <a:effectLst/>
-                                      <a:latin typeface="Cambria Math" panose="02040503050406030204" pitchFamily="18" charset="0"/>
                                     </a:rPr>
                                     <m:t>𝝁</m:t>
                                   </m:r>
@@ -15021,7 +14926,6 @@
                                         <a:schemeClr val="dk1"/>
                                       </a:solidFill>
                                       <a:effectLst/>
-                                      <a:latin typeface="Cambria Math" panose="02040503050406030204" pitchFamily="18" charset="0"/>
                                     </a:rPr>
                                     <m:t>𝒔𝒆𝒂𝒔𝒐𝒏</m:t>
                                   </m:r>
@@ -15062,12 +14966,11 @@
                               <m:sSub>
                                 <m:sSubPr>
                                   <m:ctrlPr>
-                                    <a:rPr lang="en-GB" sz="1800" b="1" i="1" kern="1200" smtClean="0">
+                                    <a:rPr lang="en-GB" sz="1800" b="1" kern="1200" smtClean="0">
                                       <a:solidFill>
                                         <a:schemeClr val="dk1"/>
                                       </a:solidFill>
                                       <a:effectLst/>
-                                      <a:latin typeface="Cambria Math" panose="02040503050406030204" pitchFamily="18" charset="0"/>
                                     </a:rPr>
                                   </m:ctrlPr>
                                 </m:sSubPr>
@@ -15078,7 +14981,6 @@
                                         <a:schemeClr val="dk1"/>
                                       </a:solidFill>
                                       <a:effectLst/>
-                                      <a:latin typeface="Cambria Math" panose="02040503050406030204" pitchFamily="18" charset="0"/>
                                     </a:rPr>
                                     <m:t>𝑯</m:t>
                                   </m:r>
@@ -15090,7 +14992,6 @@
                                         <a:schemeClr val="dk1"/>
                                       </a:solidFill>
                                       <a:effectLst/>
-                                      <a:latin typeface="Cambria Math" panose="02040503050406030204" pitchFamily="18" charset="0"/>
                                     </a:rPr>
                                     <m:t>𝜶</m:t>
                                   </m:r>
@@ -15102,19 +15003,17 @@
                                     <a:schemeClr val="dk1"/>
                                   </a:solidFill>
                                   <a:effectLst/>
-                                  <a:latin typeface="Cambria Math" panose="02040503050406030204" pitchFamily="18" charset="0"/>
                                 </a:rPr>
                                 <m:t>=</m:t>
                               </m:r>
                               <m:sSub>
                                 <m:sSubPr>
                                   <m:ctrlPr>
-                                    <a:rPr lang="en-GB" sz="1800" b="1" i="1" kern="1200" smtClean="0">
+                                    <a:rPr lang="en-GB" sz="1800" b="1" kern="1200" smtClean="0">
                                       <a:solidFill>
                                         <a:schemeClr val="dk1"/>
                                       </a:solidFill>
                                       <a:effectLst/>
-                                      <a:latin typeface="Cambria Math" panose="02040503050406030204" pitchFamily="18" charset="0"/>
                                     </a:rPr>
                                   </m:ctrlPr>
                                 </m:sSubPr>
@@ -15125,7 +15024,6 @@
                                         <a:schemeClr val="dk1"/>
                                       </a:solidFill>
                                       <a:effectLst/>
-                                      <a:latin typeface="Cambria Math" panose="02040503050406030204" pitchFamily="18" charset="0"/>
                                     </a:rPr>
                                     <m:t>𝝁</m:t>
                                   </m:r>
@@ -15137,7 +15035,6 @@
                                         <a:schemeClr val="dk1"/>
                                       </a:solidFill>
                                       <a:effectLst/>
-                                      <a:latin typeface="Cambria Math" panose="02040503050406030204" pitchFamily="18" charset="0"/>
                                     </a:rPr>
                                     <m:t>𝒘𝒊𝒏𝒕𝒆𝒓</m:t>
                                   </m:r>
@@ -15162,19 +15059,17 @@
                                     <a:schemeClr val="dk1"/>
                                   </a:solidFill>
                                   <a:effectLst/>
-                                  <a:latin typeface="Cambria Math" panose="02040503050406030204" pitchFamily="18" charset="0"/>
                                 </a:rPr>
                                 <m:t> </m:t>
                               </m:r>
                               <m:sSub>
                                 <m:sSubPr>
                                   <m:ctrlPr>
-                                    <a:rPr lang="en-GB" sz="1800" b="1" i="1" kern="1200" smtClean="0">
+                                    <a:rPr lang="en-GB" sz="1800" b="1" kern="1200" smtClean="0">
                                       <a:solidFill>
                                         <a:schemeClr val="dk1"/>
                                       </a:solidFill>
                                       <a:effectLst/>
-                                      <a:latin typeface="Cambria Math" panose="02040503050406030204" pitchFamily="18" charset="0"/>
                                     </a:rPr>
                                   </m:ctrlPr>
                                 </m:sSubPr>
@@ -15185,7 +15080,6 @@
                                         <a:schemeClr val="dk1"/>
                                       </a:solidFill>
                                       <a:effectLst/>
-                                      <a:latin typeface="Cambria Math" panose="02040503050406030204" pitchFamily="18" charset="0"/>
                                     </a:rPr>
                                     <m:t>𝝁</m:t>
                                   </m:r>
@@ -15197,7 +15091,6 @@
                                         <a:schemeClr val="dk1"/>
                                       </a:solidFill>
                                       <a:effectLst/>
-                                      <a:latin typeface="Cambria Math" panose="02040503050406030204" pitchFamily="18" charset="0"/>
                                     </a:rPr>
                                     <m:t>𝒔𝒆𝒂𝒔𝒐𝒏</m:t>
                                   </m:r>
@@ -15320,19 +15213,19 @@
                         <a:p>
                           <a:r>
                             <a:rPr lang="en-GB" b="1" dirty="0"/>
-                            <a:t>Spring:     0.491</a:t>
+                            <a:t>Spring:     0.1682</a:t>
                           </a:r>
                         </a:p>
                         <a:p>
                           <a:r>
                             <a:rPr lang="en-GB" b="1" dirty="0"/>
-                            <a:t>Summer:  0.6908</a:t>
+                            <a:t>Summer:  0.5284</a:t>
                           </a:r>
                         </a:p>
                         <a:p>
                           <a:r>
                             <a:rPr lang="en-GB" b="1" dirty="0"/>
-                            <a:t>Autumn:  0.6952</a:t>
+                            <a:t>Autumn:  0.7728</a:t>
                           </a:r>
                         </a:p>
                       </a:txBody>
@@ -15372,12 +15265,11 @@
                               <m:sSub>
                                 <m:sSubPr>
                                   <m:ctrlPr>
-                                    <a:rPr lang="en-GB" sz="1800" b="1" i="1" kern="1200" smtClean="0">
+                                    <a:rPr lang="en-GB" sz="1800" b="1" kern="1200" smtClean="0">
                                       <a:solidFill>
                                         <a:schemeClr val="dk1"/>
                                       </a:solidFill>
                                       <a:effectLst/>
-                                      <a:latin typeface="Cambria Math" panose="02040503050406030204" pitchFamily="18" charset="0"/>
                                     </a:rPr>
                                   </m:ctrlPr>
                                 </m:sSubPr>
@@ -15388,7 +15280,6 @@
                                         <a:schemeClr val="dk1"/>
                                       </a:solidFill>
                                       <a:effectLst/>
-                                      <a:latin typeface="Cambria Math" panose="02040503050406030204" pitchFamily="18" charset="0"/>
                                     </a:rPr>
                                     <m:t>𝑯</m:t>
                                   </m:r>
@@ -15400,7 +15291,6 @@
                                         <a:schemeClr val="dk1"/>
                                       </a:solidFill>
                                       <a:effectLst/>
-                                      <a:latin typeface="Cambria Math" panose="02040503050406030204" pitchFamily="18" charset="0"/>
                                     </a:rPr>
                                     <m:t>𝟎</m:t>
                                   </m:r>
@@ -15446,12 +15336,11 @@
                               <m:sSub>
                                 <m:sSubPr>
                                   <m:ctrlPr>
-                                    <a:rPr lang="en-GB" sz="1800" b="1" i="1" kern="1200" smtClean="0">
+                                    <a:rPr lang="en-GB" sz="1800" b="1" kern="1200" smtClean="0">
                                       <a:solidFill>
                                         <a:schemeClr val="dk1"/>
                                       </a:solidFill>
                                       <a:effectLst/>
-                                      <a:latin typeface="Cambria Math" panose="02040503050406030204" pitchFamily="18" charset="0"/>
                                     </a:rPr>
                                   </m:ctrlPr>
                                 </m:sSubPr>
@@ -15462,7 +15351,6 @@
                                         <a:schemeClr val="dk1"/>
                                       </a:solidFill>
                                       <a:effectLst/>
-                                      <a:latin typeface="Cambria Math" panose="02040503050406030204" pitchFamily="18" charset="0"/>
                                     </a:rPr>
                                     <m:t>𝑯</m:t>
                                   </m:r>
@@ -15474,7 +15362,6 @@
                                         <a:schemeClr val="dk1"/>
                                       </a:solidFill>
                                       <a:effectLst/>
-                                      <a:latin typeface="Cambria Math" panose="02040503050406030204" pitchFamily="18" charset="0"/>
                                     </a:rPr>
                                     <m:t>𝟎</m:t>
                                   </m:r>
@@ -15517,7 +15404,7 @@
               <p:nvPr>
                 <p:extLst>
                   <p:ext uri="{D42A27DB-BD31-4B8C-83A1-F6EECF244321}">
-                    <p14:modId xmlns:p14="http://schemas.microsoft.com/office/powerpoint/2010/main" val="2705779665"/>
+                    <p14:modId xmlns:p14="http://schemas.microsoft.com/office/powerpoint/2010/main" val="132383291"/>
                   </p:ext>
                 </p:extLst>
               </p:nvPr>
@@ -15732,19 +15619,19 @@
                         <a:p>
                           <a:r>
                             <a:rPr lang="en-GB" b="1" dirty="0"/>
-                            <a:t>Spring:     0.491</a:t>
+                            <a:t>Spring:     0.1682</a:t>
                           </a:r>
                         </a:p>
                         <a:p>
                           <a:r>
                             <a:rPr lang="en-GB" b="1" dirty="0"/>
-                            <a:t>Summer:  0.6908</a:t>
+                            <a:t>Summer:  0.5284</a:t>
                           </a:r>
                         </a:p>
                         <a:p>
                           <a:r>
                             <a:rPr lang="en-GB" b="1" dirty="0"/>
-                            <a:t>Autumn:  0.6952</a:t>
+                            <a:t>Autumn:  0.7728</a:t>
                           </a:r>
                         </a:p>
                       </a:txBody>

</xml_diff>